<commit_message>
May and June Blogwyrm (excepting June Aristotle)
May and June Blogwyrm (excepting June Aristotle)
</commit_message>
<xml_diff>
--- a/Pictures/Basic_man.pptx
+++ b/Pictures/Basic_man.pptx
@@ -104,6 +104,22 @@
       </a:defRPr>
     </a:lvl9pPr>
   </p:defaultTextStyle>
+  <p:extLst>
+    <p:ext uri="{EFAFB233-063F-42B5-8137-9DF3F51BA10A}">
+      <p15:sldGuideLst xmlns:p15="http://schemas.microsoft.com/office/powerpoint/2012/main">
+        <p15:guide id="1" orient="horz" pos="2160">
+          <p15:clr>
+            <a:srgbClr val="A4A3A4"/>
+          </p15:clr>
+        </p15:guide>
+        <p15:guide id="2" pos="2880">
+          <p15:clr>
+            <a:srgbClr val="A4A3A4"/>
+          </p15:clr>
+        </p15:guide>
+      </p15:sldGuideLst>
+    </p:ext>
+  </p:extLst>
 </p:presentation>
 </file>
 
@@ -145,10 +161,9 @@
           <a:lstStyle/>
           <a:p>
             <a:r>
-              <a:rPr lang="en-US" smtClean="0"/>
+              <a:rPr lang="en-US"/>
               <a:t>Click to edit Master title style</a:t>
             </a:r>
-            <a:endParaRPr lang="en-US"/>
           </a:p>
         </p:txBody>
       </p:sp>
@@ -264,10 +279,9 @@
           </a:lstStyle>
           <a:p>
             <a:r>
-              <a:rPr lang="en-US" smtClean="0"/>
+              <a:rPr lang="en-US"/>
               <a:t>Click to edit Master subtitle style</a:t>
             </a:r>
-            <a:endParaRPr lang="en-US"/>
           </a:p>
         </p:txBody>
       </p:sp>
@@ -288,7 +302,7 @@
           <a:p>
             <a:fld id="{B4F9729F-75EF-43C4-A4ED-9EE92AAA6AB7}" type="datetimeFigureOut">
               <a:rPr lang="en-US" smtClean="0"/>
-              <a:t>6/2/2016</a:t>
+              <a:t>5/17/2018</a:t>
             </a:fld>
             <a:endParaRPr lang="en-US"/>
           </a:p>
@@ -382,10 +396,9 @@
           <a:lstStyle/>
           <a:p>
             <a:r>
-              <a:rPr lang="en-US" smtClean="0"/>
+              <a:rPr lang="en-US"/>
               <a:t>Click to edit Master title style</a:t>
             </a:r>
-            <a:endParaRPr lang="en-US"/>
           </a:p>
         </p:txBody>
       </p:sp>
@@ -406,38 +419,37 @@
           <a:p>
             <a:pPr lvl="0"/>
             <a:r>
-              <a:rPr lang="en-US" smtClean="0"/>
+              <a:rPr lang="en-US"/>
               <a:t>Click to edit Master text styles</a:t>
             </a:r>
           </a:p>
           <a:p>
             <a:pPr lvl="1"/>
             <a:r>
-              <a:rPr lang="en-US" smtClean="0"/>
+              <a:rPr lang="en-US"/>
               <a:t>Second level</a:t>
             </a:r>
           </a:p>
           <a:p>
             <a:pPr lvl="2"/>
             <a:r>
-              <a:rPr lang="en-US" smtClean="0"/>
+              <a:rPr lang="en-US"/>
               <a:t>Third level</a:t>
             </a:r>
           </a:p>
           <a:p>
             <a:pPr lvl="3"/>
             <a:r>
-              <a:rPr lang="en-US" smtClean="0"/>
+              <a:rPr lang="en-US"/>
               <a:t>Fourth level</a:t>
             </a:r>
           </a:p>
           <a:p>
             <a:pPr lvl="4"/>
             <a:r>
-              <a:rPr lang="en-US" smtClean="0"/>
+              <a:rPr lang="en-US"/>
               <a:t>Fifth level</a:t>
             </a:r>
-            <a:endParaRPr lang="en-US"/>
           </a:p>
         </p:txBody>
       </p:sp>
@@ -458,7 +470,7 @@
           <a:p>
             <a:fld id="{B4F9729F-75EF-43C4-A4ED-9EE92AAA6AB7}" type="datetimeFigureOut">
               <a:rPr lang="en-US" smtClean="0"/>
-              <a:t>6/2/2016</a:t>
+              <a:t>5/17/2018</a:t>
             </a:fld>
             <a:endParaRPr lang="en-US"/>
           </a:p>
@@ -557,10 +569,9 @@
           <a:lstStyle/>
           <a:p>
             <a:r>
-              <a:rPr lang="en-US" smtClean="0"/>
+              <a:rPr lang="en-US"/>
               <a:t>Click to edit Master title style</a:t>
             </a:r>
-            <a:endParaRPr lang="en-US"/>
           </a:p>
         </p:txBody>
       </p:sp>
@@ -586,38 +597,37 @@
           <a:p>
             <a:pPr lvl="0"/>
             <a:r>
-              <a:rPr lang="en-US" smtClean="0"/>
+              <a:rPr lang="en-US"/>
               <a:t>Click to edit Master text styles</a:t>
             </a:r>
           </a:p>
           <a:p>
             <a:pPr lvl="1"/>
             <a:r>
-              <a:rPr lang="en-US" smtClean="0"/>
+              <a:rPr lang="en-US"/>
               <a:t>Second level</a:t>
             </a:r>
           </a:p>
           <a:p>
             <a:pPr lvl="2"/>
             <a:r>
-              <a:rPr lang="en-US" smtClean="0"/>
+              <a:rPr lang="en-US"/>
               <a:t>Third level</a:t>
             </a:r>
           </a:p>
           <a:p>
             <a:pPr lvl="3"/>
             <a:r>
-              <a:rPr lang="en-US" smtClean="0"/>
+              <a:rPr lang="en-US"/>
               <a:t>Fourth level</a:t>
             </a:r>
           </a:p>
           <a:p>
             <a:pPr lvl="4"/>
             <a:r>
-              <a:rPr lang="en-US" smtClean="0"/>
+              <a:rPr lang="en-US"/>
               <a:t>Fifth level</a:t>
             </a:r>
-            <a:endParaRPr lang="en-US"/>
           </a:p>
         </p:txBody>
       </p:sp>
@@ -638,7 +648,7 @@
           <a:p>
             <a:fld id="{B4F9729F-75EF-43C4-A4ED-9EE92AAA6AB7}" type="datetimeFigureOut">
               <a:rPr lang="en-US" smtClean="0"/>
-              <a:t>6/2/2016</a:t>
+              <a:t>5/17/2018</a:t>
             </a:fld>
             <a:endParaRPr lang="en-US"/>
           </a:p>
@@ -732,10 +742,9 @@
           <a:lstStyle/>
           <a:p>
             <a:r>
-              <a:rPr lang="en-US" smtClean="0"/>
+              <a:rPr lang="en-US"/>
               <a:t>Click to edit Master title style</a:t>
             </a:r>
-            <a:endParaRPr lang="en-US"/>
           </a:p>
         </p:txBody>
       </p:sp>
@@ -756,38 +765,37 @@
           <a:p>
             <a:pPr lvl="0"/>
             <a:r>
-              <a:rPr lang="en-US" smtClean="0"/>
+              <a:rPr lang="en-US"/>
               <a:t>Click to edit Master text styles</a:t>
             </a:r>
           </a:p>
           <a:p>
             <a:pPr lvl="1"/>
             <a:r>
-              <a:rPr lang="en-US" smtClean="0"/>
+              <a:rPr lang="en-US"/>
               <a:t>Second level</a:t>
             </a:r>
           </a:p>
           <a:p>
             <a:pPr lvl="2"/>
             <a:r>
-              <a:rPr lang="en-US" smtClean="0"/>
+              <a:rPr lang="en-US"/>
               <a:t>Third level</a:t>
             </a:r>
           </a:p>
           <a:p>
             <a:pPr lvl="3"/>
             <a:r>
-              <a:rPr lang="en-US" smtClean="0"/>
+              <a:rPr lang="en-US"/>
               <a:t>Fourth level</a:t>
             </a:r>
           </a:p>
           <a:p>
             <a:pPr lvl="4"/>
             <a:r>
-              <a:rPr lang="en-US" smtClean="0"/>
+              <a:rPr lang="en-US"/>
               <a:t>Fifth level</a:t>
             </a:r>
-            <a:endParaRPr lang="en-US"/>
           </a:p>
         </p:txBody>
       </p:sp>
@@ -808,7 +816,7 @@
           <a:p>
             <a:fld id="{B4F9729F-75EF-43C4-A4ED-9EE92AAA6AB7}" type="datetimeFigureOut">
               <a:rPr lang="en-US" smtClean="0"/>
-              <a:t>6/2/2016</a:t>
+              <a:t>5/17/2018</a:t>
             </a:fld>
             <a:endParaRPr lang="en-US"/>
           </a:p>
@@ -911,10 +919,9 @@
           </a:lstStyle>
           <a:p>
             <a:r>
-              <a:rPr lang="en-US" smtClean="0"/>
+              <a:rPr lang="en-US"/>
               <a:t>Click to edit Master title style</a:t>
             </a:r>
-            <a:endParaRPr lang="en-US"/>
           </a:p>
         </p:txBody>
       </p:sp>
@@ -1031,7 +1038,7 @@
           <a:p>
             <a:pPr lvl="0"/>
             <a:r>
-              <a:rPr lang="en-US" smtClean="0"/>
+              <a:rPr lang="en-US"/>
               <a:t>Click to edit Master text styles</a:t>
             </a:r>
           </a:p>
@@ -1054,7 +1061,7 @@
           <a:p>
             <a:fld id="{B4F9729F-75EF-43C4-A4ED-9EE92AAA6AB7}" type="datetimeFigureOut">
               <a:rPr lang="en-US" smtClean="0"/>
-              <a:t>6/2/2016</a:t>
+              <a:t>5/17/2018</a:t>
             </a:fld>
             <a:endParaRPr lang="en-US"/>
           </a:p>
@@ -1148,10 +1155,9 @@
           <a:lstStyle/>
           <a:p>
             <a:r>
-              <a:rPr lang="en-US" smtClean="0"/>
+              <a:rPr lang="en-US"/>
               <a:t>Click to edit Master title style</a:t>
             </a:r>
-            <a:endParaRPr lang="en-US"/>
           </a:p>
         </p:txBody>
       </p:sp>
@@ -1205,38 +1211,37 @@
           <a:p>
             <a:pPr lvl="0"/>
             <a:r>
-              <a:rPr lang="en-US" smtClean="0"/>
+              <a:rPr lang="en-US"/>
               <a:t>Click to edit Master text styles</a:t>
             </a:r>
           </a:p>
           <a:p>
             <a:pPr lvl="1"/>
             <a:r>
-              <a:rPr lang="en-US" smtClean="0"/>
+              <a:rPr lang="en-US"/>
               <a:t>Second level</a:t>
             </a:r>
           </a:p>
           <a:p>
             <a:pPr lvl="2"/>
             <a:r>
-              <a:rPr lang="en-US" smtClean="0"/>
+              <a:rPr lang="en-US"/>
               <a:t>Third level</a:t>
             </a:r>
           </a:p>
           <a:p>
             <a:pPr lvl="3"/>
             <a:r>
-              <a:rPr lang="en-US" smtClean="0"/>
+              <a:rPr lang="en-US"/>
               <a:t>Fourth level</a:t>
             </a:r>
           </a:p>
           <a:p>
             <a:pPr lvl="4"/>
             <a:r>
-              <a:rPr lang="en-US" smtClean="0"/>
+              <a:rPr lang="en-US"/>
               <a:t>Fifth level</a:t>
             </a:r>
-            <a:endParaRPr lang="en-US"/>
           </a:p>
         </p:txBody>
       </p:sp>
@@ -1290,38 +1295,37 @@
           <a:p>
             <a:pPr lvl="0"/>
             <a:r>
-              <a:rPr lang="en-US" smtClean="0"/>
+              <a:rPr lang="en-US"/>
               <a:t>Click to edit Master text styles</a:t>
             </a:r>
           </a:p>
           <a:p>
             <a:pPr lvl="1"/>
             <a:r>
-              <a:rPr lang="en-US" smtClean="0"/>
+              <a:rPr lang="en-US"/>
               <a:t>Second level</a:t>
             </a:r>
           </a:p>
           <a:p>
             <a:pPr lvl="2"/>
             <a:r>
-              <a:rPr lang="en-US" smtClean="0"/>
+              <a:rPr lang="en-US"/>
               <a:t>Third level</a:t>
             </a:r>
           </a:p>
           <a:p>
             <a:pPr lvl="3"/>
             <a:r>
-              <a:rPr lang="en-US" smtClean="0"/>
+              <a:rPr lang="en-US"/>
               <a:t>Fourth level</a:t>
             </a:r>
           </a:p>
           <a:p>
             <a:pPr lvl="4"/>
             <a:r>
-              <a:rPr lang="en-US" smtClean="0"/>
+              <a:rPr lang="en-US"/>
               <a:t>Fifth level</a:t>
             </a:r>
-            <a:endParaRPr lang="en-US"/>
           </a:p>
         </p:txBody>
       </p:sp>
@@ -1342,7 +1346,7 @@
           <a:p>
             <a:fld id="{B4F9729F-75EF-43C4-A4ED-9EE92AAA6AB7}" type="datetimeFigureOut">
               <a:rPr lang="en-US" smtClean="0"/>
-              <a:t>6/2/2016</a:t>
+              <a:t>5/17/2018</a:t>
             </a:fld>
             <a:endParaRPr lang="en-US"/>
           </a:p>
@@ -1440,10 +1444,9 @@
           </a:lstStyle>
           <a:p>
             <a:r>
-              <a:rPr lang="en-US" smtClean="0"/>
+              <a:rPr lang="en-US"/>
               <a:t>Click to edit Master title style</a:t>
             </a:r>
-            <a:endParaRPr lang="en-US"/>
           </a:p>
         </p:txBody>
       </p:sp>
@@ -1506,7 +1509,7 @@
           <a:p>
             <a:pPr lvl="0"/>
             <a:r>
-              <a:rPr lang="en-US" smtClean="0"/>
+              <a:rPr lang="en-US"/>
               <a:t>Click to edit Master text styles</a:t>
             </a:r>
           </a:p>
@@ -1562,38 +1565,37 @@
           <a:p>
             <a:pPr lvl="0"/>
             <a:r>
-              <a:rPr lang="en-US" smtClean="0"/>
+              <a:rPr lang="en-US"/>
               <a:t>Click to edit Master text styles</a:t>
             </a:r>
           </a:p>
           <a:p>
             <a:pPr lvl="1"/>
             <a:r>
-              <a:rPr lang="en-US" smtClean="0"/>
+              <a:rPr lang="en-US"/>
               <a:t>Second level</a:t>
             </a:r>
           </a:p>
           <a:p>
             <a:pPr lvl="2"/>
             <a:r>
-              <a:rPr lang="en-US" smtClean="0"/>
+              <a:rPr lang="en-US"/>
               <a:t>Third level</a:t>
             </a:r>
           </a:p>
           <a:p>
             <a:pPr lvl="3"/>
             <a:r>
-              <a:rPr lang="en-US" smtClean="0"/>
+              <a:rPr lang="en-US"/>
               <a:t>Fourth level</a:t>
             </a:r>
           </a:p>
           <a:p>
             <a:pPr lvl="4"/>
             <a:r>
-              <a:rPr lang="en-US" smtClean="0"/>
+              <a:rPr lang="en-US"/>
               <a:t>Fifth level</a:t>
             </a:r>
-            <a:endParaRPr lang="en-US"/>
           </a:p>
         </p:txBody>
       </p:sp>
@@ -1656,7 +1658,7 @@
           <a:p>
             <a:pPr lvl="0"/>
             <a:r>
-              <a:rPr lang="en-US" smtClean="0"/>
+              <a:rPr lang="en-US"/>
               <a:t>Click to edit Master text styles</a:t>
             </a:r>
           </a:p>
@@ -1712,38 +1714,37 @@
           <a:p>
             <a:pPr lvl="0"/>
             <a:r>
-              <a:rPr lang="en-US" smtClean="0"/>
+              <a:rPr lang="en-US"/>
               <a:t>Click to edit Master text styles</a:t>
             </a:r>
           </a:p>
           <a:p>
             <a:pPr lvl="1"/>
             <a:r>
-              <a:rPr lang="en-US" smtClean="0"/>
+              <a:rPr lang="en-US"/>
               <a:t>Second level</a:t>
             </a:r>
           </a:p>
           <a:p>
             <a:pPr lvl="2"/>
             <a:r>
-              <a:rPr lang="en-US" smtClean="0"/>
+              <a:rPr lang="en-US"/>
               <a:t>Third level</a:t>
             </a:r>
           </a:p>
           <a:p>
             <a:pPr lvl="3"/>
             <a:r>
-              <a:rPr lang="en-US" smtClean="0"/>
+              <a:rPr lang="en-US"/>
               <a:t>Fourth level</a:t>
             </a:r>
           </a:p>
           <a:p>
             <a:pPr lvl="4"/>
             <a:r>
-              <a:rPr lang="en-US" smtClean="0"/>
+              <a:rPr lang="en-US"/>
               <a:t>Fifth level</a:t>
             </a:r>
-            <a:endParaRPr lang="en-US"/>
           </a:p>
         </p:txBody>
       </p:sp>
@@ -1764,7 +1765,7 @@
           <a:p>
             <a:fld id="{B4F9729F-75EF-43C4-A4ED-9EE92AAA6AB7}" type="datetimeFigureOut">
               <a:rPr lang="en-US" smtClean="0"/>
-              <a:t>6/2/2016</a:t>
+              <a:t>5/17/2018</a:t>
             </a:fld>
             <a:endParaRPr lang="en-US"/>
           </a:p>
@@ -1858,10 +1859,9 @@
           <a:lstStyle/>
           <a:p>
             <a:r>
-              <a:rPr lang="en-US" smtClean="0"/>
+              <a:rPr lang="en-US"/>
               <a:t>Click to edit Master title style</a:t>
             </a:r>
-            <a:endParaRPr lang="en-US"/>
           </a:p>
         </p:txBody>
       </p:sp>
@@ -1882,7 +1882,7 @@
           <a:p>
             <a:fld id="{B4F9729F-75EF-43C4-A4ED-9EE92AAA6AB7}" type="datetimeFigureOut">
               <a:rPr lang="en-US" smtClean="0"/>
-              <a:t>6/2/2016</a:t>
+              <a:t>5/17/2018</a:t>
             </a:fld>
             <a:endParaRPr lang="en-US"/>
           </a:p>
@@ -1977,7 +1977,7 @@
           <a:p>
             <a:fld id="{B4F9729F-75EF-43C4-A4ED-9EE92AAA6AB7}" type="datetimeFigureOut">
               <a:rPr lang="en-US" smtClean="0"/>
-              <a:t>6/2/2016</a:t>
+              <a:t>5/17/2018</a:t>
             </a:fld>
             <a:endParaRPr lang="en-US"/>
           </a:p>
@@ -2080,10 +2080,9 @@
           </a:lstStyle>
           <a:p>
             <a:r>
-              <a:rPr lang="en-US" smtClean="0"/>
+              <a:rPr lang="en-US"/>
               <a:t>Click to edit Master title style</a:t>
             </a:r>
-            <a:endParaRPr lang="en-US"/>
           </a:p>
         </p:txBody>
       </p:sp>
@@ -2137,38 +2136,37 @@
           <a:p>
             <a:pPr lvl="0"/>
             <a:r>
-              <a:rPr lang="en-US" smtClean="0"/>
+              <a:rPr lang="en-US"/>
               <a:t>Click to edit Master text styles</a:t>
             </a:r>
           </a:p>
           <a:p>
             <a:pPr lvl="1"/>
             <a:r>
-              <a:rPr lang="en-US" smtClean="0"/>
+              <a:rPr lang="en-US"/>
               <a:t>Second level</a:t>
             </a:r>
           </a:p>
           <a:p>
             <a:pPr lvl="2"/>
             <a:r>
-              <a:rPr lang="en-US" smtClean="0"/>
+              <a:rPr lang="en-US"/>
               <a:t>Third level</a:t>
             </a:r>
           </a:p>
           <a:p>
             <a:pPr lvl="3"/>
             <a:r>
-              <a:rPr lang="en-US" smtClean="0"/>
+              <a:rPr lang="en-US"/>
               <a:t>Fourth level</a:t>
             </a:r>
           </a:p>
           <a:p>
             <a:pPr lvl="4"/>
             <a:r>
-              <a:rPr lang="en-US" smtClean="0"/>
+              <a:rPr lang="en-US"/>
               <a:t>Fifth level</a:t>
             </a:r>
-            <a:endParaRPr lang="en-US"/>
           </a:p>
         </p:txBody>
       </p:sp>
@@ -2231,7 +2229,7 @@
           <a:p>
             <a:pPr lvl="0"/>
             <a:r>
-              <a:rPr lang="en-US" smtClean="0"/>
+              <a:rPr lang="en-US"/>
               <a:t>Click to edit Master text styles</a:t>
             </a:r>
           </a:p>
@@ -2254,7 +2252,7 @@
           <a:p>
             <a:fld id="{B4F9729F-75EF-43C4-A4ED-9EE92AAA6AB7}" type="datetimeFigureOut">
               <a:rPr lang="en-US" smtClean="0"/>
-              <a:t>6/2/2016</a:t>
+              <a:t>5/17/2018</a:t>
             </a:fld>
             <a:endParaRPr lang="en-US"/>
           </a:p>
@@ -2357,10 +2355,9 @@
           </a:lstStyle>
           <a:p>
             <a:r>
-              <a:rPr lang="en-US" smtClean="0"/>
+              <a:rPr lang="en-US"/>
               <a:t>Click to edit Master title style</a:t>
             </a:r>
-            <a:endParaRPr lang="en-US"/>
           </a:p>
         </p:txBody>
       </p:sp>
@@ -2484,7 +2481,7 @@
           <a:p>
             <a:pPr lvl="0"/>
             <a:r>
-              <a:rPr lang="en-US" smtClean="0"/>
+              <a:rPr lang="en-US"/>
               <a:t>Click to edit Master text styles</a:t>
             </a:r>
           </a:p>
@@ -2507,7 +2504,7 @@
           <a:p>
             <a:fld id="{B4F9729F-75EF-43C4-A4ED-9EE92AAA6AB7}" type="datetimeFigureOut">
               <a:rPr lang="en-US" smtClean="0"/>
-              <a:t>6/2/2016</a:t>
+              <a:t>5/17/2018</a:t>
             </a:fld>
             <a:endParaRPr lang="en-US"/>
           </a:p>
@@ -2616,10 +2613,9 @@
           <a:lstStyle/>
           <a:p>
             <a:r>
-              <a:rPr lang="en-US" smtClean="0"/>
+              <a:rPr lang="en-US"/>
               <a:t>Click to edit Master title style</a:t>
             </a:r>
-            <a:endParaRPr lang="en-US"/>
           </a:p>
         </p:txBody>
       </p:sp>
@@ -2650,38 +2646,37 @@
           <a:p>
             <a:pPr lvl="0"/>
             <a:r>
-              <a:rPr lang="en-US" smtClean="0"/>
+              <a:rPr lang="en-US"/>
               <a:t>Click to edit Master text styles</a:t>
             </a:r>
           </a:p>
           <a:p>
             <a:pPr lvl="1"/>
             <a:r>
-              <a:rPr lang="en-US" smtClean="0"/>
+              <a:rPr lang="en-US"/>
               <a:t>Second level</a:t>
             </a:r>
           </a:p>
           <a:p>
             <a:pPr lvl="2"/>
             <a:r>
-              <a:rPr lang="en-US" smtClean="0"/>
+              <a:rPr lang="en-US"/>
               <a:t>Third level</a:t>
             </a:r>
           </a:p>
           <a:p>
             <a:pPr lvl="3"/>
             <a:r>
-              <a:rPr lang="en-US" smtClean="0"/>
+              <a:rPr lang="en-US"/>
               <a:t>Fourth level</a:t>
             </a:r>
           </a:p>
           <a:p>
             <a:pPr lvl="4"/>
             <a:r>
-              <a:rPr lang="en-US" smtClean="0"/>
+              <a:rPr lang="en-US"/>
               <a:t>Fifth level</a:t>
             </a:r>
-            <a:endParaRPr lang="en-US"/>
           </a:p>
         </p:txBody>
       </p:sp>
@@ -2720,7 +2715,7 @@
           <a:p>
             <a:fld id="{B4F9729F-75EF-43C4-A4ED-9EE92AAA6AB7}" type="datetimeFigureOut">
               <a:rPr lang="en-US" smtClean="0"/>
-              <a:t>6/2/2016</a:t>
+              <a:t>5/17/2018</a:t>
             </a:fld>
             <a:endParaRPr lang="en-US"/>
           </a:p>
@@ -3452,7 +3447,7 @@
         </p:nvSpPr>
         <p:spPr>
           <a:xfrm rot="10800000">
-            <a:off x="5105400" y="1867269"/>
+            <a:off x="4811500" y="1927183"/>
             <a:ext cx="381000" cy="1784412"/>
           </a:xfrm>
           <a:custGeom>
@@ -3553,6 +3548,1567 @@
           </a:p>
         </p:txBody>
       </p:sp>
+      <p:grpSp>
+        <p:nvGrpSpPr>
+          <p:cNvPr id="2" name="Group 1">
+            <a:extLst>
+              <a:ext uri="{FF2B5EF4-FFF2-40B4-BE49-F238E27FC236}">
+                <a16:creationId xmlns:a16="http://schemas.microsoft.com/office/drawing/2014/main" id="{F5905A1B-3443-4770-804D-3EE93A562266}"/>
+              </a:ext>
+            </a:extLst>
+          </p:cNvPr>
+          <p:cNvGrpSpPr/>
+          <p:nvPr/>
+        </p:nvGrpSpPr>
+        <p:grpSpPr>
+          <a:xfrm>
+            <a:off x="6447896" y="545833"/>
+            <a:ext cx="1816025" cy="4710441"/>
+            <a:chOff x="6447896" y="545833"/>
+            <a:chExt cx="1816025" cy="4710441"/>
+          </a:xfrm>
+        </p:grpSpPr>
+        <p:sp>
+          <p:nvSpPr>
+            <p:cNvPr id="25" name="Rounded Rectangle 7">
+              <a:extLst>
+                <a:ext uri="{FF2B5EF4-FFF2-40B4-BE49-F238E27FC236}">
+                  <a16:creationId xmlns:a16="http://schemas.microsoft.com/office/drawing/2014/main" id="{45E8A76C-D4FA-4C96-B4B1-37FD5A14E1AA}"/>
+                </a:ext>
+              </a:extLst>
+            </p:cNvPr>
+            <p:cNvSpPr/>
+            <p:nvPr/>
+          </p:nvSpPr>
+          <p:spPr>
+            <a:xfrm rot="21333369" flipH="1">
+              <a:off x="8009058" y="1846441"/>
+              <a:ext cx="254863" cy="1225550"/>
+            </a:xfrm>
+            <a:custGeom>
+              <a:avLst/>
+              <a:gdLst>
+                <a:gd name="connsiteX0" fmla="*/ 0 w 254863"/>
+                <a:gd name="connsiteY0" fmla="*/ 42478 h 1219200"/>
+                <a:gd name="connsiteX1" fmla="*/ 42478 w 254863"/>
+                <a:gd name="connsiteY1" fmla="*/ 0 h 1219200"/>
+                <a:gd name="connsiteX2" fmla="*/ 212385 w 254863"/>
+                <a:gd name="connsiteY2" fmla="*/ 0 h 1219200"/>
+                <a:gd name="connsiteX3" fmla="*/ 254863 w 254863"/>
+                <a:gd name="connsiteY3" fmla="*/ 42478 h 1219200"/>
+                <a:gd name="connsiteX4" fmla="*/ 254863 w 254863"/>
+                <a:gd name="connsiteY4" fmla="*/ 1176722 h 1219200"/>
+                <a:gd name="connsiteX5" fmla="*/ 212385 w 254863"/>
+                <a:gd name="connsiteY5" fmla="*/ 1219200 h 1219200"/>
+                <a:gd name="connsiteX6" fmla="*/ 42478 w 254863"/>
+                <a:gd name="connsiteY6" fmla="*/ 1219200 h 1219200"/>
+                <a:gd name="connsiteX7" fmla="*/ 0 w 254863"/>
+                <a:gd name="connsiteY7" fmla="*/ 1176722 h 1219200"/>
+                <a:gd name="connsiteX8" fmla="*/ 0 w 254863"/>
+                <a:gd name="connsiteY8" fmla="*/ 42478 h 1219200"/>
+                <a:gd name="connsiteX0" fmla="*/ 0 w 254863"/>
+                <a:gd name="connsiteY0" fmla="*/ 42478 h 1219200"/>
+                <a:gd name="connsiteX1" fmla="*/ 42478 w 254863"/>
+                <a:gd name="connsiteY1" fmla="*/ 0 h 1219200"/>
+                <a:gd name="connsiteX2" fmla="*/ 212385 w 254863"/>
+                <a:gd name="connsiteY2" fmla="*/ 0 h 1219200"/>
+                <a:gd name="connsiteX3" fmla="*/ 254863 w 254863"/>
+                <a:gd name="connsiteY3" fmla="*/ 42478 h 1219200"/>
+                <a:gd name="connsiteX4" fmla="*/ 229463 w 254863"/>
+                <a:gd name="connsiteY4" fmla="*/ 1068772 h 1219200"/>
+                <a:gd name="connsiteX5" fmla="*/ 212385 w 254863"/>
+                <a:gd name="connsiteY5" fmla="*/ 1219200 h 1219200"/>
+                <a:gd name="connsiteX6" fmla="*/ 42478 w 254863"/>
+                <a:gd name="connsiteY6" fmla="*/ 1219200 h 1219200"/>
+                <a:gd name="connsiteX7" fmla="*/ 0 w 254863"/>
+                <a:gd name="connsiteY7" fmla="*/ 1176722 h 1219200"/>
+                <a:gd name="connsiteX8" fmla="*/ 0 w 254863"/>
+                <a:gd name="connsiteY8" fmla="*/ 42478 h 1219200"/>
+                <a:gd name="connsiteX0" fmla="*/ 0 w 254863"/>
+                <a:gd name="connsiteY0" fmla="*/ 42478 h 1219200"/>
+                <a:gd name="connsiteX1" fmla="*/ 42478 w 254863"/>
+                <a:gd name="connsiteY1" fmla="*/ 0 h 1219200"/>
+                <a:gd name="connsiteX2" fmla="*/ 212385 w 254863"/>
+                <a:gd name="connsiteY2" fmla="*/ 0 h 1219200"/>
+                <a:gd name="connsiteX3" fmla="*/ 254863 w 254863"/>
+                <a:gd name="connsiteY3" fmla="*/ 42478 h 1219200"/>
+                <a:gd name="connsiteX4" fmla="*/ 229463 w 254863"/>
+                <a:gd name="connsiteY4" fmla="*/ 1068772 h 1219200"/>
+                <a:gd name="connsiteX5" fmla="*/ 212385 w 254863"/>
+                <a:gd name="connsiteY5" fmla="*/ 1219200 h 1219200"/>
+                <a:gd name="connsiteX6" fmla="*/ 42478 w 254863"/>
+                <a:gd name="connsiteY6" fmla="*/ 1219200 h 1219200"/>
+                <a:gd name="connsiteX7" fmla="*/ 38100 w 254863"/>
+                <a:gd name="connsiteY7" fmla="*/ 1062422 h 1219200"/>
+                <a:gd name="connsiteX8" fmla="*/ 0 w 254863"/>
+                <a:gd name="connsiteY8" fmla="*/ 42478 h 1219200"/>
+                <a:gd name="connsiteX0" fmla="*/ 0 w 254863"/>
+                <a:gd name="connsiteY0" fmla="*/ 42478 h 1219200"/>
+                <a:gd name="connsiteX1" fmla="*/ 42478 w 254863"/>
+                <a:gd name="connsiteY1" fmla="*/ 0 h 1219200"/>
+                <a:gd name="connsiteX2" fmla="*/ 212385 w 254863"/>
+                <a:gd name="connsiteY2" fmla="*/ 0 h 1219200"/>
+                <a:gd name="connsiteX3" fmla="*/ 254863 w 254863"/>
+                <a:gd name="connsiteY3" fmla="*/ 42478 h 1219200"/>
+                <a:gd name="connsiteX4" fmla="*/ 210413 w 254863"/>
+                <a:gd name="connsiteY4" fmla="*/ 884622 h 1219200"/>
+                <a:gd name="connsiteX5" fmla="*/ 212385 w 254863"/>
+                <a:gd name="connsiteY5" fmla="*/ 1219200 h 1219200"/>
+                <a:gd name="connsiteX6" fmla="*/ 42478 w 254863"/>
+                <a:gd name="connsiteY6" fmla="*/ 1219200 h 1219200"/>
+                <a:gd name="connsiteX7" fmla="*/ 38100 w 254863"/>
+                <a:gd name="connsiteY7" fmla="*/ 1062422 h 1219200"/>
+                <a:gd name="connsiteX8" fmla="*/ 0 w 254863"/>
+                <a:gd name="connsiteY8" fmla="*/ 42478 h 1219200"/>
+                <a:gd name="connsiteX0" fmla="*/ 0 w 254863"/>
+                <a:gd name="connsiteY0" fmla="*/ 42478 h 1219200"/>
+                <a:gd name="connsiteX1" fmla="*/ 42478 w 254863"/>
+                <a:gd name="connsiteY1" fmla="*/ 0 h 1219200"/>
+                <a:gd name="connsiteX2" fmla="*/ 212385 w 254863"/>
+                <a:gd name="connsiteY2" fmla="*/ 0 h 1219200"/>
+                <a:gd name="connsiteX3" fmla="*/ 254863 w 254863"/>
+                <a:gd name="connsiteY3" fmla="*/ 42478 h 1219200"/>
+                <a:gd name="connsiteX4" fmla="*/ 210413 w 254863"/>
+                <a:gd name="connsiteY4" fmla="*/ 884622 h 1219200"/>
+                <a:gd name="connsiteX5" fmla="*/ 212385 w 254863"/>
+                <a:gd name="connsiteY5" fmla="*/ 1219200 h 1219200"/>
+                <a:gd name="connsiteX6" fmla="*/ 42478 w 254863"/>
+                <a:gd name="connsiteY6" fmla="*/ 1219200 h 1219200"/>
+                <a:gd name="connsiteX7" fmla="*/ 69850 w 254863"/>
+                <a:gd name="connsiteY7" fmla="*/ 859222 h 1219200"/>
+                <a:gd name="connsiteX8" fmla="*/ 0 w 254863"/>
+                <a:gd name="connsiteY8" fmla="*/ 42478 h 1219200"/>
+                <a:gd name="connsiteX0" fmla="*/ 0 w 254863"/>
+                <a:gd name="connsiteY0" fmla="*/ 42478 h 1225550"/>
+                <a:gd name="connsiteX1" fmla="*/ 42478 w 254863"/>
+                <a:gd name="connsiteY1" fmla="*/ 0 h 1225550"/>
+                <a:gd name="connsiteX2" fmla="*/ 212385 w 254863"/>
+                <a:gd name="connsiteY2" fmla="*/ 0 h 1225550"/>
+                <a:gd name="connsiteX3" fmla="*/ 254863 w 254863"/>
+                <a:gd name="connsiteY3" fmla="*/ 42478 h 1225550"/>
+                <a:gd name="connsiteX4" fmla="*/ 210413 w 254863"/>
+                <a:gd name="connsiteY4" fmla="*/ 884622 h 1225550"/>
+                <a:gd name="connsiteX5" fmla="*/ 212385 w 254863"/>
+                <a:gd name="connsiteY5" fmla="*/ 1219200 h 1225550"/>
+                <a:gd name="connsiteX6" fmla="*/ 80578 w 254863"/>
+                <a:gd name="connsiteY6" fmla="*/ 1225550 h 1225550"/>
+                <a:gd name="connsiteX7" fmla="*/ 69850 w 254863"/>
+                <a:gd name="connsiteY7" fmla="*/ 859222 h 1225550"/>
+                <a:gd name="connsiteX8" fmla="*/ 0 w 254863"/>
+                <a:gd name="connsiteY8" fmla="*/ 42478 h 1225550"/>
+                <a:gd name="connsiteX0" fmla="*/ 0 w 254863"/>
+                <a:gd name="connsiteY0" fmla="*/ 42478 h 1225550"/>
+                <a:gd name="connsiteX1" fmla="*/ 42478 w 254863"/>
+                <a:gd name="connsiteY1" fmla="*/ 0 h 1225550"/>
+                <a:gd name="connsiteX2" fmla="*/ 212385 w 254863"/>
+                <a:gd name="connsiteY2" fmla="*/ 0 h 1225550"/>
+                <a:gd name="connsiteX3" fmla="*/ 254863 w 254863"/>
+                <a:gd name="connsiteY3" fmla="*/ 42478 h 1225550"/>
+                <a:gd name="connsiteX4" fmla="*/ 210413 w 254863"/>
+                <a:gd name="connsiteY4" fmla="*/ 884622 h 1225550"/>
+                <a:gd name="connsiteX5" fmla="*/ 180635 w 254863"/>
+                <a:gd name="connsiteY5" fmla="*/ 1219200 h 1225550"/>
+                <a:gd name="connsiteX6" fmla="*/ 80578 w 254863"/>
+                <a:gd name="connsiteY6" fmla="*/ 1225550 h 1225550"/>
+                <a:gd name="connsiteX7" fmla="*/ 69850 w 254863"/>
+                <a:gd name="connsiteY7" fmla="*/ 859222 h 1225550"/>
+                <a:gd name="connsiteX8" fmla="*/ 0 w 254863"/>
+                <a:gd name="connsiteY8" fmla="*/ 42478 h 1225550"/>
+              </a:gdLst>
+              <a:ahLst/>
+              <a:cxnLst>
+                <a:cxn ang="0">
+                  <a:pos x="connsiteX0" y="connsiteY0"/>
+                </a:cxn>
+                <a:cxn ang="0">
+                  <a:pos x="connsiteX1" y="connsiteY1"/>
+                </a:cxn>
+                <a:cxn ang="0">
+                  <a:pos x="connsiteX2" y="connsiteY2"/>
+                </a:cxn>
+                <a:cxn ang="0">
+                  <a:pos x="connsiteX3" y="connsiteY3"/>
+                </a:cxn>
+                <a:cxn ang="0">
+                  <a:pos x="connsiteX4" y="connsiteY4"/>
+                </a:cxn>
+                <a:cxn ang="0">
+                  <a:pos x="connsiteX5" y="connsiteY5"/>
+                </a:cxn>
+                <a:cxn ang="0">
+                  <a:pos x="connsiteX6" y="connsiteY6"/>
+                </a:cxn>
+                <a:cxn ang="0">
+                  <a:pos x="connsiteX7" y="connsiteY7"/>
+                </a:cxn>
+                <a:cxn ang="0">
+                  <a:pos x="connsiteX8" y="connsiteY8"/>
+                </a:cxn>
+              </a:cxnLst>
+              <a:rect l="l" t="t" r="r" b="b"/>
+              <a:pathLst>
+                <a:path w="254863" h="1225550">
+                  <a:moveTo>
+                    <a:pt x="0" y="42478"/>
+                  </a:moveTo>
+                  <a:cubicBezTo>
+                    <a:pt x="0" y="19018"/>
+                    <a:pt x="19018" y="0"/>
+                    <a:pt x="42478" y="0"/>
+                  </a:cubicBezTo>
+                  <a:lnTo>
+                    <a:pt x="212385" y="0"/>
+                  </a:lnTo>
+                  <a:cubicBezTo>
+                    <a:pt x="235845" y="0"/>
+                    <a:pt x="254863" y="19018"/>
+                    <a:pt x="254863" y="42478"/>
+                  </a:cubicBezTo>
+                  <a:cubicBezTo>
+                    <a:pt x="254863" y="420559"/>
+                    <a:pt x="210413" y="506541"/>
+                    <a:pt x="210413" y="884622"/>
+                  </a:cubicBezTo>
+                  <a:cubicBezTo>
+                    <a:pt x="210413" y="908082"/>
+                    <a:pt x="204095" y="1219200"/>
+                    <a:pt x="180635" y="1219200"/>
+                  </a:cubicBezTo>
+                  <a:lnTo>
+                    <a:pt x="80578" y="1225550"/>
+                  </a:lnTo>
+                  <a:cubicBezTo>
+                    <a:pt x="57118" y="1225550"/>
+                    <a:pt x="69850" y="882682"/>
+                    <a:pt x="69850" y="859222"/>
+                  </a:cubicBezTo>
+                  <a:lnTo>
+                    <a:pt x="0" y="42478"/>
+                  </a:lnTo>
+                  <a:close/>
+                </a:path>
+              </a:pathLst>
+            </a:custGeom>
+          </p:spPr>
+          <p:style>
+            <a:lnRef idx="2">
+              <a:schemeClr val="accent1">
+                <a:shade val="50000"/>
+              </a:schemeClr>
+            </a:lnRef>
+            <a:fillRef idx="1">
+              <a:schemeClr val="accent1"/>
+            </a:fillRef>
+            <a:effectRef idx="0">
+              <a:schemeClr val="accent1"/>
+            </a:effectRef>
+            <a:fontRef idx="minor">
+              <a:schemeClr val="lt1"/>
+            </a:fontRef>
+          </p:style>
+          <p:txBody>
+            <a:bodyPr rtlCol="0" anchor="ctr"/>
+            <a:lstStyle/>
+            <a:p>
+              <a:pPr algn="ctr"/>
+              <a:endParaRPr lang="en-US"/>
+            </a:p>
+          </p:txBody>
+        </p:sp>
+        <p:sp>
+          <p:nvSpPr>
+            <p:cNvPr id="26" name="Pie 5">
+              <a:extLst>
+                <a:ext uri="{FF2B5EF4-FFF2-40B4-BE49-F238E27FC236}">
+                  <a16:creationId xmlns:a16="http://schemas.microsoft.com/office/drawing/2014/main" id="{53DA1327-3111-4C39-9891-6F1F9328BE0A}"/>
+                </a:ext>
+              </a:extLst>
+            </p:cNvPr>
+            <p:cNvSpPr/>
+            <p:nvPr/>
+          </p:nvSpPr>
+          <p:spPr>
+            <a:xfrm flipH="1">
+              <a:off x="7620000" y="1384033"/>
+              <a:ext cx="609599" cy="631326"/>
+            </a:xfrm>
+            <a:custGeom>
+              <a:avLst/>
+              <a:gdLst>
+                <a:gd name="connsiteX0" fmla="*/ 387 w 1219200"/>
+                <a:gd name="connsiteY0" fmla="*/ 631326 h 1219200"/>
+                <a:gd name="connsiteX1" fmla="*/ 170933 w 1219200"/>
+                <a:gd name="connsiteY1" fmla="*/ 186299 h 1219200"/>
+                <a:gd name="connsiteX2" fmla="*/ 609599 w 1219200"/>
+                <a:gd name="connsiteY2" fmla="*/ 0 h 1219200"/>
+                <a:gd name="connsiteX3" fmla="*/ 609600 w 1219200"/>
+                <a:gd name="connsiteY3" fmla="*/ 609600 h 1219200"/>
+                <a:gd name="connsiteX4" fmla="*/ 387 w 1219200"/>
+                <a:gd name="connsiteY4" fmla="*/ 631326 h 1219200"/>
+                <a:gd name="connsiteX0" fmla="*/ 387 w 609599"/>
+                <a:gd name="connsiteY0" fmla="*/ 631326 h 631326"/>
+                <a:gd name="connsiteX1" fmla="*/ 170933 w 609599"/>
+                <a:gd name="connsiteY1" fmla="*/ 186299 h 631326"/>
+                <a:gd name="connsiteX2" fmla="*/ 609599 w 609599"/>
+                <a:gd name="connsiteY2" fmla="*/ 0 h 631326"/>
+                <a:gd name="connsiteX3" fmla="*/ 508000 w 609599"/>
+                <a:gd name="connsiteY3" fmla="*/ 533400 h 631326"/>
+                <a:gd name="connsiteX4" fmla="*/ 387 w 609599"/>
+                <a:gd name="connsiteY4" fmla="*/ 631326 h 631326"/>
+              </a:gdLst>
+              <a:ahLst/>
+              <a:cxnLst>
+                <a:cxn ang="0">
+                  <a:pos x="connsiteX0" y="connsiteY0"/>
+                </a:cxn>
+                <a:cxn ang="0">
+                  <a:pos x="connsiteX1" y="connsiteY1"/>
+                </a:cxn>
+                <a:cxn ang="0">
+                  <a:pos x="connsiteX2" y="connsiteY2"/>
+                </a:cxn>
+                <a:cxn ang="0">
+                  <a:pos x="connsiteX3" y="connsiteY3"/>
+                </a:cxn>
+                <a:cxn ang="0">
+                  <a:pos x="connsiteX4" y="connsiteY4"/>
+                </a:cxn>
+              </a:cxnLst>
+              <a:rect l="l" t="t" r="r" b="b"/>
+              <a:pathLst>
+                <a:path w="609599" h="631326">
+                  <a:moveTo>
+                    <a:pt x="387" y="631326"/>
+                  </a:moveTo>
+                  <a:cubicBezTo>
+                    <a:pt x="-5509" y="465987"/>
+                    <a:pt x="56050" y="305352"/>
+                    <a:pt x="170933" y="186299"/>
+                  </a:cubicBezTo>
+                  <a:cubicBezTo>
+                    <a:pt x="285816" y="67246"/>
+                    <a:pt x="444155" y="0"/>
+                    <a:pt x="609599" y="0"/>
+                  </a:cubicBezTo>
+                  <a:cubicBezTo>
+                    <a:pt x="609599" y="203200"/>
+                    <a:pt x="508000" y="330200"/>
+                    <a:pt x="508000" y="533400"/>
+                  </a:cubicBezTo>
+                  <a:cubicBezTo>
+                    <a:pt x="304929" y="540642"/>
+                    <a:pt x="203458" y="624084"/>
+                    <a:pt x="387" y="631326"/>
+                  </a:cubicBezTo>
+                  <a:close/>
+                </a:path>
+              </a:pathLst>
+            </a:custGeom>
+          </p:spPr>
+          <p:style>
+            <a:lnRef idx="2">
+              <a:schemeClr val="accent1">
+                <a:shade val="50000"/>
+              </a:schemeClr>
+            </a:lnRef>
+            <a:fillRef idx="1">
+              <a:schemeClr val="accent1"/>
+            </a:fillRef>
+            <a:effectRef idx="0">
+              <a:schemeClr val="accent1"/>
+            </a:effectRef>
+            <a:fontRef idx="minor">
+              <a:schemeClr val="lt1"/>
+            </a:fontRef>
+          </p:style>
+          <p:txBody>
+            <a:bodyPr rtlCol="0" anchor="ctr"/>
+            <a:lstStyle/>
+            <a:p>
+              <a:pPr algn="ctr"/>
+              <a:endParaRPr lang="en-US">
+                <a:solidFill>
+                  <a:schemeClr val="tx1"/>
+                </a:solidFill>
+              </a:endParaRPr>
+            </a:p>
+          </p:txBody>
+        </p:sp>
+        <p:sp>
+          <p:nvSpPr>
+            <p:cNvPr id="24" name="Rounded Rectangle 10">
+              <a:extLst>
+                <a:ext uri="{FF2B5EF4-FFF2-40B4-BE49-F238E27FC236}">
+                  <a16:creationId xmlns:a16="http://schemas.microsoft.com/office/drawing/2014/main" id="{35C708C2-98C6-415D-B6D7-00E55ED116EB}"/>
+                </a:ext>
+              </a:extLst>
+            </p:cNvPr>
+            <p:cNvSpPr/>
+            <p:nvPr/>
+          </p:nvSpPr>
+          <p:spPr>
+            <a:xfrm>
+              <a:off x="7529512" y="3469875"/>
+              <a:ext cx="419100" cy="1786399"/>
+            </a:xfrm>
+            <a:custGeom>
+              <a:avLst/>
+              <a:gdLst>
+                <a:gd name="connsiteX0" fmla="*/ 0 w 419100"/>
+                <a:gd name="connsiteY0" fmla="*/ 69851 h 1752600"/>
+                <a:gd name="connsiteX1" fmla="*/ 69851 w 419100"/>
+                <a:gd name="connsiteY1" fmla="*/ 0 h 1752600"/>
+                <a:gd name="connsiteX2" fmla="*/ 349249 w 419100"/>
+                <a:gd name="connsiteY2" fmla="*/ 0 h 1752600"/>
+                <a:gd name="connsiteX3" fmla="*/ 419100 w 419100"/>
+                <a:gd name="connsiteY3" fmla="*/ 69851 h 1752600"/>
+                <a:gd name="connsiteX4" fmla="*/ 419100 w 419100"/>
+                <a:gd name="connsiteY4" fmla="*/ 1682749 h 1752600"/>
+                <a:gd name="connsiteX5" fmla="*/ 349249 w 419100"/>
+                <a:gd name="connsiteY5" fmla="*/ 1752600 h 1752600"/>
+                <a:gd name="connsiteX6" fmla="*/ 69851 w 419100"/>
+                <a:gd name="connsiteY6" fmla="*/ 1752600 h 1752600"/>
+                <a:gd name="connsiteX7" fmla="*/ 0 w 419100"/>
+                <a:gd name="connsiteY7" fmla="*/ 1682749 h 1752600"/>
+                <a:gd name="connsiteX8" fmla="*/ 0 w 419100"/>
+                <a:gd name="connsiteY8" fmla="*/ 69851 h 1752600"/>
+                <a:gd name="connsiteX0" fmla="*/ 0 w 419100"/>
+                <a:gd name="connsiteY0" fmla="*/ 69851 h 1752600"/>
+                <a:gd name="connsiteX1" fmla="*/ 69851 w 419100"/>
+                <a:gd name="connsiteY1" fmla="*/ 0 h 1752600"/>
+                <a:gd name="connsiteX2" fmla="*/ 349249 w 419100"/>
+                <a:gd name="connsiteY2" fmla="*/ 0 h 1752600"/>
+                <a:gd name="connsiteX3" fmla="*/ 419100 w 419100"/>
+                <a:gd name="connsiteY3" fmla="*/ 69851 h 1752600"/>
+                <a:gd name="connsiteX4" fmla="*/ 389603 w 419100"/>
+                <a:gd name="connsiteY4" fmla="*/ 1461523 h 1752600"/>
+                <a:gd name="connsiteX5" fmla="*/ 349249 w 419100"/>
+                <a:gd name="connsiteY5" fmla="*/ 1752600 h 1752600"/>
+                <a:gd name="connsiteX6" fmla="*/ 69851 w 419100"/>
+                <a:gd name="connsiteY6" fmla="*/ 1752600 h 1752600"/>
+                <a:gd name="connsiteX7" fmla="*/ 0 w 419100"/>
+                <a:gd name="connsiteY7" fmla="*/ 1682749 h 1752600"/>
+                <a:gd name="connsiteX8" fmla="*/ 0 w 419100"/>
+                <a:gd name="connsiteY8" fmla="*/ 69851 h 1752600"/>
+                <a:gd name="connsiteX0" fmla="*/ 0 w 419100"/>
+                <a:gd name="connsiteY0" fmla="*/ 69851 h 1752600"/>
+                <a:gd name="connsiteX1" fmla="*/ 69851 w 419100"/>
+                <a:gd name="connsiteY1" fmla="*/ 0 h 1752600"/>
+                <a:gd name="connsiteX2" fmla="*/ 349249 w 419100"/>
+                <a:gd name="connsiteY2" fmla="*/ 0 h 1752600"/>
+                <a:gd name="connsiteX3" fmla="*/ 419100 w 419100"/>
+                <a:gd name="connsiteY3" fmla="*/ 69851 h 1752600"/>
+                <a:gd name="connsiteX4" fmla="*/ 389603 w 419100"/>
+                <a:gd name="connsiteY4" fmla="*/ 1461523 h 1752600"/>
+                <a:gd name="connsiteX5" fmla="*/ 349249 w 419100"/>
+                <a:gd name="connsiteY5" fmla="*/ 1752600 h 1752600"/>
+                <a:gd name="connsiteX6" fmla="*/ 69851 w 419100"/>
+                <a:gd name="connsiteY6" fmla="*/ 1752600 h 1752600"/>
+                <a:gd name="connsiteX7" fmla="*/ 29497 w 419100"/>
+                <a:gd name="connsiteY7" fmla="*/ 1446775 h 1752600"/>
+                <a:gd name="connsiteX8" fmla="*/ 0 w 419100"/>
+                <a:gd name="connsiteY8" fmla="*/ 69851 h 1752600"/>
+                <a:gd name="connsiteX0" fmla="*/ 0 w 419100"/>
+                <a:gd name="connsiteY0" fmla="*/ 69851 h 1752600"/>
+                <a:gd name="connsiteX1" fmla="*/ 69851 w 419100"/>
+                <a:gd name="connsiteY1" fmla="*/ 0 h 1752600"/>
+                <a:gd name="connsiteX2" fmla="*/ 349249 w 419100"/>
+                <a:gd name="connsiteY2" fmla="*/ 0 h 1752600"/>
+                <a:gd name="connsiteX3" fmla="*/ 419100 w 419100"/>
+                <a:gd name="connsiteY3" fmla="*/ 69851 h 1752600"/>
+                <a:gd name="connsiteX4" fmla="*/ 374855 w 419100"/>
+                <a:gd name="connsiteY4" fmla="*/ 1151806 h 1752600"/>
+                <a:gd name="connsiteX5" fmla="*/ 349249 w 419100"/>
+                <a:gd name="connsiteY5" fmla="*/ 1752600 h 1752600"/>
+                <a:gd name="connsiteX6" fmla="*/ 69851 w 419100"/>
+                <a:gd name="connsiteY6" fmla="*/ 1752600 h 1752600"/>
+                <a:gd name="connsiteX7" fmla="*/ 29497 w 419100"/>
+                <a:gd name="connsiteY7" fmla="*/ 1446775 h 1752600"/>
+                <a:gd name="connsiteX8" fmla="*/ 0 w 419100"/>
+                <a:gd name="connsiteY8" fmla="*/ 69851 h 1752600"/>
+                <a:gd name="connsiteX0" fmla="*/ 0 w 419100"/>
+                <a:gd name="connsiteY0" fmla="*/ 69851 h 1752600"/>
+                <a:gd name="connsiteX1" fmla="*/ 69851 w 419100"/>
+                <a:gd name="connsiteY1" fmla="*/ 0 h 1752600"/>
+                <a:gd name="connsiteX2" fmla="*/ 349249 w 419100"/>
+                <a:gd name="connsiteY2" fmla="*/ 0 h 1752600"/>
+                <a:gd name="connsiteX3" fmla="*/ 419100 w 419100"/>
+                <a:gd name="connsiteY3" fmla="*/ 69851 h 1752600"/>
+                <a:gd name="connsiteX4" fmla="*/ 374855 w 419100"/>
+                <a:gd name="connsiteY4" fmla="*/ 1151806 h 1752600"/>
+                <a:gd name="connsiteX5" fmla="*/ 349249 w 419100"/>
+                <a:gd name="connsiteY5" fmla="*/ 1752600 h 1752600"/>
+                <a:gd name="connsiteX6" fmla="*/ 69851 w 419100"/>
+                <a:gd name="connsiteY6" fmla="*/ 1752600 h 1752600"/>
+                <a:gd name="connsiteX7" fmla="*/ 44245 w 419100"/>
+                <a:gd name="connsiteY7" fmla="*/ 1151807 h 1752600"/>
+                <a:gd name="connsiteX8" fmla="*/ 0 w 419100"/>
+                <a:gd name="connsiteY8" fmla="*/ 69851 h 1752600"/>
+                <a:gd name="connsiteX0" fmla="*/ 0 w 419100"/>
+                <a:gd name="connsiteY0" fmla="*/ 69851 h 1767349"/>
+                <a:gd name="connsiteX1" fmla="*/ 69851 w 419100"/>
+                <a:gd name="connsiteY1" fmla="*/ 0 h 1767349"/>
+                <a:gd name="connsiteX2" fmla="*/ 349249 w 419100"/>
+                <a:gd name="connsiteY2" fmla="*/ 0 h 1767349"/>
+                <a:gd name="connsiteX3" fmla="*/ 419100 w 419100"/>
+                <a:gd name="connsiteY3" fmla="*/ 69851 h 1767349"/>
+                <a:gd name="connsiteX4" fmla="*/ 374855 w 419100"/>
+                <a:gd name="connsiteY4" fmla="*/ 1151806 h 1767349"/>
+                <a:gd name="connsiteX5" fmla="*/ 305004 w 419100"/>
+                <a:gd name="connsiteY5" fmla="*/ 1767349 h 1767349"/>
+                <a:gd name="connsiteX6" fmla="*/ 69851 w 419100"/>
+                <a:gd name="connsiteY6" fmla="*/ 1752600 h 1767349"/>
+                <a:gd name="connsiteX7" fmla="*/ 44245 w 419100"/>
+                <a:gd name="connsiteY7" fmla="*/ 1151807 h 1767349"/>
+                <a:gd name="connsiteX8" fmla="*/ 0 w 419100"/>
+                <a:gd name="connsiteY8" fmla="*/ 69851 h 1767349"/>
+                <a:gd name="connsiteX0" fmla="*/ 0 w 419100"/>
+                <a:gd name="connsiteY0" fmla="*/ 69851 h 1776412"/>
+                <a:gd name="connsiteX1" fmla="*/ 69851 w 419100"/>
+                <a:gd name="connsiteY1" fmla="*/ 0 h 1776412"/>
+                <a:gd name="connsiteX2" fmla="*/ 349249 w 419100"/>
+                <a:gd name="connsiteY2" fmla="*/ 0 h 1776412"/>
+                <a:gd name="connsiteX3" fmla="*/ 419100 w 419100"/>
+                <a:gd name="connsiteY3" fmla="*/ 69851 h 1776412"/>
+                <a:gd name="connsiteX4" fmla="*/ 374855 w 419100"/>
+                <a:gd name="connsiteY4" fmla="*/ 1151806 h 1776412"/>
+                <a:gd name="connsiteX5" fmla="*/ 305004 w 419100"/>
+                <a:gd name="connsiteY5" fmla="*/ 1767349 h 1776412"/>
+                <a:gd name="connsiteX6" fmla="*/ 117476 w 419100"/>
+                <a:gd name="connsiteY6" fmla="*/ 1776412 h 1776412"/>
+                <a:gd name="connsiteX7" fmla="*/ 44245 w 419100"/>
+                <a:gd name="connsiteY7" fmla="*/ 1151807 h 1776412"/>
+                <a:gd name="connsiteX8" fmla="*/ 0 w 419100"/>
+                <a:gd name="connsiteY8" fmla="*/ 69851 h 1776412"/>
+                <a:gd name="connsiteX0" fmla="*/ 0 w 419100"/>
+                <a:gd name="connsiteY0" fmla="*/ 69851 h 1786399"/>
+                <a:gd name="connsiteX1" fmla="*/ 69851 w 419100"/>
+                <a:gd name="connsiteY1" fmla="*/ 0 h 1786399"/>
+                <a:gd name="connsiteX2" fmla="*/ 349249 w 419100"/>
+                <a:gd name="connsiteY2" fmla="*/ 0 h 1786399"/>
+                <a:gd name="connsiteX3" fmla="*/ 419100 w 419100"/>
+                <a:gd name="connsiteY3" fmla="*/ 69851 h 1786399"/>
+                <a:gd name="connsiteX4" fmla="*/ 374855 w 419100"/>
+                <a:gd name="connsiteY4" fmla="*/ 1151806 h 1786399"/>
+                <a:gd name="connsiteX5" fmla="*/ 290717 w 419100"/>
+                <a:gd name="connsiteY5" fmla="*/ 1786399 h 1786399"/>
+                <a:gd name="connsiteX6" fmla="*/ 117476 w 419100"/>
+                <a:gd name="connsiteY6" fmla="*/ 1776412 h 1786399"/>
+                <a:gd name="connsiteX7" fmla="*/ 44245 w 419100"/>
+                <a:gd name="connsiteY7" fmla="*/ 1151807 h 1786399"/>
+                <a:gd name="connsiteX8" fmla="*/ 0 w 419100"/>
+                <a:gd name="connsiteY8" fmla="*/ 69851 h 1786399"/>
+              </a:gdLst>
+              <a:ahLst/>
+              <a:cxnLst>
+                <a:cxn ang="0">
+                  <a:pos x="connsiteX0" y="connsiteY0"/>
+                </a:cxn>
+                <a:cxn ang="0">
+                  <a:pos x="connsiteX1" y="connsiteY1"/>
+                </a:cxn>
+                <a:cxn ang="0">
+                  <a:pos x="connsiteX2" y="connsiteY2"/>
+                </a:cxn>
+                <a:cxn ang="0">
+                  <a:pos x="connsiteX3" y="connsiteY3"/>
+                </a:cxn>
+                <a:cxn ang="0">
+                  <a:pos x="connsiteX4" y="connsiteY4"/>
+                </a:cxn>
+                <a:cxn ang="0">
+                  <a:pos x="connsiteX5" y="connsiteY5"/>
+                </a:cxn>
+                <a:cxn ang="0">
+                  <a:pos x="connsiteX6" y="connsiteY6"/>
+                </a:cxn>
+                <a:cxn ang="0">
+                  <a:pos x="connsiteX7" y="connsiteY7"/>
+                </a:cxn>
+                <a:cxn ang="0">
+                  <a:pos x="connsiteX8" y="connsiteY8"/>
+                </a:cxn>
+              </a:cxnLst>
+              <a:rect l="l" t="t" r="r" b="b"/>
+              <a:pathLst>
+                <a:path w="419100" h="1786399">
+                  <a:moveTo>
+                    <a:pt x="0" y="69851"/>
+                  </a:moveTo>
+                  <a:cubicBezTo>
+                    <a:pt x="0" y="31273"/>
+                    <a:pt x="31273" y="0"/>
+                    <a:pt x="69851" y="0"/>
+                  </a:cubicBezTo>
+                  <a:lnTo>
+                    <a:pt x="349249" y="0"/>
+                  </a:lnTo>
+                  <a:cubicBezTo>
+                    <a:pt x="387827" y="0"/>
+                    <a:pt x="419100" y="31273"/>
+                    <a:pt x="419100" y="69851"/>
+                  </a:cubicBezTo>
+                  <a:cubicBezTo>
+                    <a:pt x="419100" y="607484"/>
+                    <a:pt x="374855" y="614173"/>
+                    <a:pt x="374855" y="1151806"/>
+                  </a:cubicBezTo>
+                  <a:cubicBezTo>
+                    <a:pt x="374855" y="1190384"/>
+                    <a:pt x="329295" y="1786399"/>
+                    <a:pt x="290717" y="1786399"/>
+                  </a:cubicBezTo>
+                  <a:lnTo>
+                    <a:pt x="117476" y="1776412"/>
+                  </a:lnTo>
+                  <a:cubicBezTo>
+                    <a:pt x="78898" y="1776412"/>
+                    <a:pt x="44245" y="1190385"/>
+                    <a:pt x="44245" y="1151807"/>
+                  </a:cubicBezTo>
+                  <a:lnTo>
+                    <a:pt x="0" y="69851"/>
+                  </a:lnTo>
+                  <a:close/>
+                </a:path>
+              </a:pathLst>
+            </a:custGeom>
+          </p:spPr>
+          <p:style>
+            <a:lnRef idx="2">
+              <a:schemeClr val="accent1">
+                <a:shade val="50000"/>
+              </a:schemeClr>
+            </a:lnRef>
+            <a:fillRef idx="1">
+              <a:schemeClr val="accent1"/>
+            </a:fillRef>
+            <a:effectRef idx="0">
+              <a:schemeClr val="accent1"/>
+            </a:effectRef>
+            <a:fontRef idx="minor">
+              <a:schemeClr val="lt1"/>
+            </a:fontRef>
+          </p:style>
+          <p:txBody>
+            <a:bodyPr rtlCol="0" anchor="ctr"/>
+            <a:lstStyle/>
+            <a:p>
+              <a:pPr algn="ctr"/>
+              <a:endParaRPr lang="en-US"/>
+            </a:p>
+          </p:txBody>
+        </p:sp>
+        <p:grpSp>
+          <p:nvGrpSpPr>
+            <p:cNvPr id="14" name="Group 13">
+              <a:extLst>
+                <a:ext uri="{FF2B5EF4-FFF2-40B4-BE49-F238E27FC236}">
+                  <a16:creationId xmlns:a16="http://schemas.microsoft.com/office/drawing/2014/main" id="{68A99622-C0A7-48E2-AA75-0E809BDDB56A}"/>
+                </a:ext>
+              </a:extLst>
+            </p:cNvPr>
+            <p:cNvGrpSpPr/>
+            <p:nvPr/>
+          </p:nvGrpSpPr>
+          <p:grpSpPr>
+            <a:xfrm>
+              <a:off x="6447896" y="545833"/>
+              <a:ext cx="1677237" cy="4682000"/>
+              <a:chOff x="1952096" y="609600"/>
+              <a:chExt cx="1677237" cy="4682000"/>
+            </a:xfrm>
+          </p:grpSpPr>
+          <p:sp>
+            <p:nvSpPr>
+              <p:cNvPr id="15" name="Rounded Rectangle 10">
+                <a:extLst>
+                  <a:ext uri="{FF2B5EF4-FFF2-40B4-BE49-F238E27FC236}">
+                    <a16:creationId xmlns:a16="http://schemas.microsoft.com/office/drawing/2014/main" id="{7C8BCD01-F0FB-479D-918D-9F8CA8BF9D6D}"/>
+                  </a:ext>
+                </a:extLst>
+              </p:cNvPr>
+              <p:cNvSpPr/>
+              <p:nvPr/>
+            </p:nvSpPr>
+            <p:spPr>
+              <a:xfrm>
+                <a:off x="2247900" y="3505201"/>
+                <a:ext cx="419100" cy="1786399"/>
+              </a:xfrm>
+              <a:custGeom>
+                <a:avLst/>
+                <a:gdLst>
+                  <a:gd name="connsiteX0" fmla="*/ 0 w 419100"/>
+                  <a:gd name="connsiteY0" fmla="*/ 69851 h 1752600"/>
+                  <a:gd name="connsiteX1" fmla="*/ 69851 w 419100"/>
+                  <a:gd name="connsiteY1" fmla="*/ 0 h 1752600"/>
+                  <a:gd name="connsiteX2" fmla="*/ 349249 w 419100"/>
+                  <a:gd name="connsiteY2" fmla="*/ 0 h 1752600"/>
+                  <a:gd name="connsiteX3" fmla="*/ 419100 w 419100"/>
+                  <a:gd name="connsiteY3" fmla="*/ 69851 h 1752600"/>
+                  <a:gd name="connsiteX4" fmla="*/ 419100 w 419100"/>
+                  <a:gd name="connsiteY4" fmla="*/ 1682749 h 1752600"/>
+                  <a:gd name="connsiteX5" fmla="*/ 349249 w 419100"/>
+                  <a:gd name="connsiteY5" fmla="*/ 1752600 h 1752600"/>
+                  <a:gd name="connsiteX6" fmla="*/ 69851 w 419100"/>
+                  <a:gd name="connsiteY6" fmla="*/ 1752600 h 1752600"/>
+                  <a:gd name="connsiteX7" fmla="*/ 0 w 419100"/>
+                  <a:gd name="connsiteY7" fmla="*/ 1682749 h 1752600"/>
+                  <a:gd name="connsiteX8" fmla="*/ 0 w 419100"/>
+                  <a:gd name="connsiteY8" fmla="*/ 69851 h 1752600"/>
+                  <a:gd name="connsiteX0" fmla="*/ 0 w 419100"/>
+                  <a:gd name="connsiteY0" fmla="*/ 69851 h 1752600"/>
+                  <a:gd name="connsiteX1" fmla="*/ 69851 w 419100"/>
+                  <a:gd name="connsiteY1" fmla="*/ 0 h 1752600"/>
+                  <a:gd name="connsiteX2" fmla="*/ 349249 w 419100"/>
+                  <a:gd name="connsiteY2" fmla="*/ 0 h 1752600"/>
+                  <a:gd name="connsiteX3" fmla="*/ 419100 w 419100"/>
+                  <a:gd name="connsiteY3" fmla="*/ 69851 h 1752600"/>
+                  <a:gd name="connsiteX4" fmla="*/ 389603 w 419100"/>
+                  <a:gd name="connsiteY4" fmla="*/ 1461523 h 1752600"/>
+                  <a:gd name="connsiteX5" fmla="*/ 349249 w 419100"/>
+                  <a:gd name="connsiteY5" fmla="*/ 1752600 h 1752600"/>
+                  <a:gd name="connsiteX6" fmla="*/ 69851 w 419100"/>
+                  <a:gd name="connsiteY6" fmla="*/ 1752600 h 1752600"/>
+                  <a:gd name="connsiteX7" fmla="*/ 0 w 419100"/>
+                  <a:gd name="connsiteY7" fmla="*/ 1682749 h 1752600"/>
+                  <a:gd name="connsiteX8" fmla="*/ 0 w 419100"/>
+                  <a:gd name="connsiteY8" fmla="*/ 69851 h 1752600"/>
+                  <a:gd name="connsiteX0" fmla="*/ 0 w 419100"/>
+                  <a:gd name="connsiteY0" fmla="*/ 69851 h 1752600"/>
+                  <a:gd name="connsiteX1" fmla="*/ 69851 w 419100"/>
+                  <a:gd name="connsiteY1" fmla="*/ 0 h 1752600"/>
+                  <a:gd name="connsiteX2" fmla="*/ 349249 w 419100"/>
+                  <a:gd name="connsiteY2" fmla="*/ 0 h 1752600"/>
+                  <a:gd name="connsiteX3" fmla="*/ 419100 w 419100"/>
+                  <a:gd name="connsiteY3" fmla="*/ 69851 h 1752600"/>
+                  <a:gd name="connsiteX4" fmla="*/ 389603 w 419100"/>
+                  <a:gd name="connsiteY4" fmla="*/ 1461523 h 1752600"/>
+                  <a:gd name="connsiteX5" fmla="*/ 349249 w 419100"/>
+                  <a:gd name="connsiteY5" fmla="*/ 1752600 h 1752600"/>
+                  <a:gd name="connsiteX6" fmla="*/ 69851 w 419100"/>
+                  <a:gd name="connsiteY6" fmla="*/ 1752600 h 1752600"/>
+                  <a:gd name="connsiteX7" fmla="*/ 29497 w 419100"/>
+                  <a:gd name="connsiteY7" fmla="*/ 1446775 h 1752600"/>
+                  <a:gd name="connsiteX8" fmla="*/ 0 w 419100"/>
+                  <a:gd name="connsiteY8" fmla="*/ 69851 h 1752600"/>
+                  <a:gd name="connsiteX0" fmla="*/ 0 w 419100"/>
+                  <a:gd name="connsiteY0" fmla="*/ 69851 h 1752600"/>
+                  <a:gd name="connsiteX1" fmla="*/ 69851 w 419100"/>
+                  <a:gd name="connsiteY1" fmla="*/ 0 h 1752600"/>
+                  <a:gd name="connsiteX2" fmla="*/ 349249 w 419100"/>
+                  <a:gd name="connsiteY2" fmla="*/ 0 h 1752600"/>
+                  <a:gd name="connsiteX3" fmla="*/ 419100 w 419100"/>
+                  <a:gd name="connsiteY3" fmla="*/ 69851 h 1752600"/>
+                  <a:gd name="connsiteX4" fmla="*/ 374855 w 419100"/>
+                  <a:gd name="connsiteY4" fmla="*/ 1151806 h 1752600"/>
+                  <a:gd name="connsiteX5" fmla="*/ 349249 w 419100"/>
+                  <a:gd name="connsiteY5" fmla="*/ 1752600 h 1752600"/>
+                  <a:gd name="connsiteX6" fmla="*/ 69851 w 419100"/>
+                  <a:gd name="connsiteY6" fmla="*/ 1752600 h 1752600"/>
+                  <a:gd name="connsiteX7" fmla="*/ 29497 w 419100"/>
+                  <a:gd name="connsiteY7" fmla="*/ 1446775 h 1752600"/>
+                  <a:gd name="connsiteX8" fmla="*/ 0 w 419100"/>
+                  <a:gd name="connsiteY8" fmla="*/ 69851 h 1752600"/>
+                  <a:gd name="connsiteX0" fmla="*/ 0 w 419100"/>
+                  <a:gd name="connsiteY0" fmla="*/ 69851 h 1752600"/>
+                  <a:gd name="connsiteX1" fmla="*/ 69851 w 419100"/>
+                  <a:gd name="connsiteY1" fmla="*/ 0 h 1752600"/>
+                  <a:gd name="connsiteX2" fmla="*/ 349249 w 419100"/>
+                  <a:gd name="connsiteY2" fmla="*/ 0 h 1752600"/>
+                  <a:gd name="connsiteX3" fmla="*/ 419100 w 419100"/>
+                  <a:gd name="connsiteY3" fmla="*/ 69851 h 1752600"/>
+                  <a:gd name="connsiteX4" fmla="*/ 374855 w 419100"/>
+                  <a:gd name="connsiteY4" fmla="*/ 1151806 h 1752600"/>
+                  <a:gd name="connsiteX5" fmla="*/ 349249 w 419100"/>
+                  <a:gd name="connsiteY5" fmla="*/ 1752600 h 1752600"/>
+                  <a:gd name="connsiteX6" fmla="*/ 69851 w 419100"/>
+                  <a:gd name="connsiteY6" fmla="*/ 1752600 h 1752600"/>
+                  <a:gd name="connsiteX7" fmla="*/ 44245 w 419100"/>
+                  <a:gd name="connsiteY7" fmla="*/ 1151807 h 1752600"/>
+                  <a:gd name="connsiteX8" fmla="*/ 0 w 419100"/>
+                  <a:gd name="connsiteY8" fmla="*/ 69851 h 1752600"/>
+                  <a:gd name="connsiteX0" fmla="*/ 0 w 419100"/>
+                  <a:gd name="connsiteY0" fmla="*/ 69851 h 1767349"/>
+                  <a:gd name="connsiteX1" fmla="*/ 69851 w 419100"/>
+                  <a:gd name="connsiteY1" fmla="*/ 0 h 1767349"/>
+                  <a:gd name="connsiteX2" fmla="*/ 349249 w 419100"/>
+                  <a:gd name="connsiteY2" fmla="*/ 0 h 1767349"/>
+                  <a:gd name="connsiteX3" fmla="*/ 419100 w 419100"/>
+                  <a:gd name="connsiteY3" fmla="*/ 69851 h 1767349"/>
+                  <a:gd name="connsiteX4" fmla="*/ 374855 w 419100"/>
+                  <a:gd name="connsiteY4" fmla="*/ 1151806 h 1767349"/>
+                  <a:gd name="connsiteX5" fmla="*/ 305004 w 419100"/>
+                  <a:gd name="connsiteY5" fmla="*/ 1767349 h 1767349"/>
+                  <a:gd name="connsiteX6" fmla="*/ 69851 w 419100"/>
+                  <a:gd name="connsiteY6" fmla="*/ 1752600 h 1767349"/>
+                  <a:gd name="connsiteX7" fmla="*/ 44245 w 419100"/>
+                  <a:gd name="connsiteY7" fmla="*/ 1151807 h 1767349"/>
+                  <a:gd name="connsiteX8" fmla="*/ 0 w 419100"/>
+                  <a:gd name="connsiteY8" fmla="*/ 69851 h 1767349"/>
+                  <a:gd name="connsiteX0" fmla="*/ 0 w 419100"/>
+                  <a:gd name="connsiteY0" fmla="*/ 69851 h 1776412"/>
+                  <a:gd name="connsiteX1" fmla="*/ 69851 w 419100"/>
+                  <a:gd name="connsiteY1" fmla="*/ 0 h 1776412"/>
+                  <a:gd name="connsiteX2" fmla="*/ 349249 w 419100"/>
+                  <a:gd name="connsiteY2" fmla="*/ 0 h 1776412"/>
+                  <a:gd name="connsiteX3" fmla="*/ 419100 w 419100"/>
+                  <a:gd name="connsiteY3" fmla="*/ 69851 h 1776412"/>
+                  <a:gd name="connsiteX4" fmla="*/ 374855 w 419100"/>
+                  <a:gd name="connsiteY4" fmla="*/ 1151806 h 1776412"/>
+                  <a:gd name="connsiteX5" fmla="*/ 305004 w 419100"/>
+                  <a:gd name="connsiteY5" fmla="*/ 1767349 h 1776412"/>
+                  <a:gd name="connsiteX6" fmla="*/ 117476 w 419100"/>
+                  <a:gd name="connsiteY6" fmla="*/ 1776412 h 1776412"/>
+                  <a:gd name="connsiteX7" fmla="*/ 44245 w 419100"/>
+                  <a:gd name="connsiteY7" fmla="*/ 1151807 h 1776412"/>
+                  <a:gd name="connsiteX8" fmla="*/ 0 w 419100"/>
+                  <a:gd name="connsiteY8" fmla="*/ 69851 h 1776412"/>
+                  <a:gd name="connsiteX0" fmla="*/ 0 w 419100"/>
+                  <a:gd name="connsiteY0" fmla="*/ 69851 h 1786399"/>
+                  <a:gd name="connsiteX1" fmla="*/ 69851 w 419100"/>
+                  <a:gd name="connsiteY1" fmla="*/ 0 h 1786399"/>
+                  <a:gd name="connsiteX2" fmla="*/ 349249 w 419100"/>
+                  <a:gd name="connsiteY2" fmla="*/ 0 h 1786399"/>
+                  <a:gd name="connsiteX3" fmla="*/ 419100 w 419100"/>
+                  <a:gd name="connsiteY3" fmla="*/ 69851 h 1786399"/>
+                  <a:gd name="connsiteX4" fmla="*/ 374855 w 419100"/>
+                  <a:gd name="connsiteY4" fmla="*/ 1151806 h 1786399"/>
+                  <a:gd name="connsiteX5" fmla="*/ 290717 w 419100"/>
+                  <a:gd name="connsiteY5" fmla="*/ 1786399 h 1786399"/>
+                  <a:gd name="connsiteX6" fmla="*/ 117476 w 419100"/>
+                  <a:gd name="connsiteY6" fmla="*/ 1776412 h 1786399"/>
+                  <a:gd name="connsiteX7" fmla="*/ 44245 w 419100"/>
+                  <a:gd name="connsiteY7" fmla="*/ 1151807 h 1786399"/>
+                  <a:gd name="connsiteX8" fmla="*/ 0 w 419100"/>
+                  <a:gd name="connsiteY8" fmla="*/ 69851 h 1786399"/>
+                </a:gdLst>
+                <a:ahLst/>
+                <a:cxnLst>
+                  <a:cxn ang="0">
+                    <a:pos x="connsiteX0" y="connsiteY0"/>
+                  </a:cxn>
+                  <a:cxn ang="0">
+                    <a:pos x="connsiteX1" y="connsiteY1"/>
+                  </a:cxn>
+                  <a:cxn ang="0">
+                    <a:pos x="connsiteX2" y="connsiteY2"/>
+                  </a:cxn>
+                  <a:cxn ang="0">
+                    <a:pos x="connsiteX3" y="connsiteY3"/>
+                  </a:cxn>
+                  <a:cxn ang="0">
+                    <a:pos x="connsiteX4" y="connsiteY4"/>
+                  </a:cxn>
+                  <a:cxn ang="0">
+                    <a:pos x="connsiteX5" y="connsiteY5"/>
+                  </a:cxn>
+                  <a:cxn ang="0">
+                    <a:pos x="connsiteX6" y="connsiteY6"/>
+                  </a:cxn>
+                  <a:cxn ang="0">
+                    <a:pos x="connsiteX7" y="connsiteY7"/>
+                  </a:cxn>
+                  <a:cxn ang="0">
+                    <a:pos x="connsiteX8" y="connsiteY8"/>
+                  </a:cxn>
+                </a:cxnLst>
+                <a:rect l="l" t="t" r="r" b="b"/>
+                <a:pathLst>
+                  <a:path w="419100" h="1786399">
+                    <a:moveTo>
+                      <a:pt x="0" y="69851"/>
+                    </a:moveTo>
+                    <a:cubicBezTo>
+                      <a:pt x="0" y="31273"/>
+                      <a:pt x="31273" y="0"/>
+                      <a:pt x="69851" y="0"/>
+                    </a:cubicBezTo>
+                    <a:lnTo>
+                      <a:pt x="349249" y="0"/>
+                    </a:lnTo>
+                    <a:cubicBezTo>
+                      <a:pt x="387827" y="0"/>
+                      <a:pt x="419100" y="31273"/>
+                      <a:pt x="419100" y="69851"/>
+                    </a:cubicBezTo>
+                    <a:cubicBezTo>
+                      <a:pt x="419100" y="607484"/>
+                      <a:pt x="374855" y="614173"/>
+                      <a:pt x="374855" y="1151806"/>
+                    </a:cubicBezTo>
+                    <a:cubicBezTo>
+                      <a:pt x="374855" y="1190384"/>
+                      <a:pt x="329295" y="1786399"/>
+                      <a:pt x="290717" y="1786399"/>
+                    </a:cubicBezTo>
+                    <a:lnTo>
+                      <a:pt x="117476" y="1776412"/>
+                    </a:lnTo>
+                    <a:cubicBezTo>
+                      <a:pt x="78898" y="1776412"/>
+                      <a:pt x="44245" y="1190385"/>
+                      <a:pt x="44245" y="1151807"/>
+                    </a:cubicBezTo>
+                    <a:lnTo>
+                      <a:pt x="0" y="69851"/>
+                    </a:lnTo>
+                    <a:close/>
+                  </a:path>
+                </a:pathLst>
+              </a:custGeom>
+            </p:spPr>
+            <p:style>
+              <a:lnRef idx="2">
+                <a:schemeClr val="accent1">
+                  <a:shade val="50000"/>
+                </a:schemeClr>
+              </a:lnRef>
+              <a:fillRef idx="1">
+                <a:schemeClr val="accent1"/>
+              </a:fillRef>
+              <a:effectRef idx="0">
+                <a:schemeClr val="accent1"/>
+              </a:effectRef>
+              <a:fontRef idx="minor">
+                <a:schemeClr val="lt1"/>
+              </a:fontRef>
+            </p:style>
+            <p:txBody>
+              <a:bodyPr rtlCol="0" anchor="ctr"/>
+              <a:lstStyle/>
+              <a:p>
+                <a:pPr algn="ctr"/>
+                <a:endParaRPr lang="en-US"/>
+              </a:p>
+            </p:txBody>
+          </p:sp>
+          <p:sp>
+            <p:nvSpPr>
+              <p:cNvPr id="18" name="Rounded Rectangle 7">
+                <a:extLst>
+                  <a:ext uri="{FF2B5EF4-FFF2-40B4-BE49-F238E27FC236}">
+                    <a16:creationId xmlns:a16="http://schemas.microsoft.com/office/drawing/2014/main" id="{2FCA7F83-935A-4D30-9FAA-88AC0FF8F272}"/>
+                  </a:ext>
+                </a:extLst>
+              </p:cNvPr>
+              <p:cNvSpPr/>
+              <p:nvPr/>
+            </p:nvSpPr>
+            <p:spPr>
+              <a:xfrm rot="266631">
+                <a:off x="1952096" y="1911333"/>
+                <a:ext cx="254863" cy="1225550"/>
+              </a:xfrm>
+              <a:custGeom>
+                <a:avLst/>
+                <a:gdLst>
+                  <a:gd name="connsiteX0" fmla="*/ 0 w 254863"/>
+                  <a:gd name="connsiteY0" fmla="*/ 42478 h 1219200"/>
+                  <a:gd name="connsiteX1" fmla="*/ 42478 w 254863"/>
+                  <a:gd name="connsiteY1" fmla="*/ 0 h 1219200"/>
+                  <a:gd name="connsiteX2" fmla="*/ 212385 w 254863"/>
+                  <a:gd name="connsiteY2" fmla="*/ 0 h 1219200"/>
+                  <a:gd name="connsiteX3" fmla="*/ 254863 w 254863"/>
+                  <a:gd name="connsiteY3" fmla="*/ 42478 h 1219200"/>
+                  <a:gd name="connsiteX4" fmla="*/ 254863 w 254863"/>
+                  <a:gd name="connsiteY4" fmla="*/ 1176722 h 1219200"/>
+                  <a:gd name="connsiteX5" fmla="*/ 212385 w 254863"/>
+                  <a:gd name="connsiteY5" fmla="*/ 1219200 h 1219200"/>
+                  <a:gd name="connsiteX6" fmla="*/ 42478 w 254863"/>
+                  <a:gd name="connsiteY6" fmla="*/ 1219200 h 1219200"/>
+                  <a:gd name="connsiteX7" fmla="*/ 0 w 254863"/>
+                  <a:gd name="connsiteY7" fmla="*/ 1176722 h 1219200"/>
+                  <a:gd name="connsiteX8" fmla="*/ 0 w 254863"/>
+                  <a:gd name="connsiteY8" fmla="*/ 42478 h 1219200"/>
+                  <a:gd name="connsiteX0" fmla="*/ 0 w 254863"/>
+                  <a:gd name="connsiteY0" fmla="*/ 42478 h 1219200"/>
+                  <a:gd name="connsiteX1" fmla="*/ 42478 w 254863"/>
+                  <a:gd name="connsiteY1" fmla="*/ 0 h 1219200"/>
+                  <a:gd name="connsiteX2" fmla="*/ 212385 w 254863"/>
+                  <a:gd name="connsiteY2" fmla="*/ 0 h 1219200"/>
+                  <a:gd name="connsiteX3" fmla="*/ 254863 w 254863"/>
+                  <a:gd name="connsiteY3" fmla="*/ 42478 h 1219200"/>
+                  <a:gd name="connsiteX4" fmla="*/ 229463 w 254863"/>
+                  <a:gd name="connsiteY4" fmla="*/ 1068772 h 1219200"/>
+                  <a:gd name="connsiteX5" fmla="*/ 212385 w 254863"/>
+                  <a:gd name="connsiteY5" fmla="*/ 1219200 h 1219200"/>
+                  <a:gd name="connsiteX6" fmla="*/ 42478 w 254863"/>
+                  <a:gd name="connsiteY6" fmla="*/ 1219200 h 1219200"/>
+                  <a:gd name="connsiteX7" fmla="*/ 0 w 254863"/>
+                  <a:gd name="connsiteY7" fmla="*/ 1176722 h 1219200"/>
+                  <a:gd name="connsiteX8" fmla="*/ 0 w 254863"/>
+                  <a:gd name="connsiteY8" fmla="*/ 42478 h 1219200"/>
+                  <a:gd name="connsiteX0" fmla="*/ 0 w 254863"/>
+                  <a:gd name="connsiteY0" fmla="*/ 42478 h 1219200"/>
+                  <a:gd name="connsiteX1" fmla="*/ 42478 w 254863"/>
+                  <a:gd name="connsiteY1" fmla="*/ 0 h 1219200"/>
+                  <a:gd name="connsiteX2" fmla="*/ 212385 w 254863"/>
+                  <a:gd name="connsiteY2" fmla="*/ 0 h 1219200"/>
+                  <a:gd name="connsiteX3" fmla="*/ 254863 w 254863"/>
+                  <a:gd name="connsiteY3" fmla="*/ 42478 h 1219200"/>
+                  <a:gd name="connsiteX4" fmla="*/ 229463 w 254863"/>
+                  <a:gd name="connsiteY4" fmla="*/ 1068772 h 1219200"/>
+                  <a:gd name="connsiteX5" fmla="*/ 212385 w 254863"/>
+                  <a:gd name="connsiteY5" fmla="*/ 1219200 h 1219200"/>
+                  <a:gd name="connsiteX6" fmla="*/ 42478 w 254863"/>
+                  <a:gd name="connsiteY6" fmla="*/ 1219200 h 1219200"/>
+                  <a:gd name="connsiteX7" fmla="*/ 38100 w 254863"/>
+                  <a:gd name="connsiteY7" fmla="*/ 1062422 h 1219200"/>
+                  <a:gd name="connsiteX8" fmla="*/ 0 w 254863"/>
+                  <a:gd name="connsiteY8" fmla="*/ 42478 h 1219200"/>
+                  <a:gd name="connsiteX0" fmla="*/ 0 w 254863"/>
+                  <a:gd name="connsiteY0" fmla="*/ 42478 h 1219200"/>
+                  <a:gd name="connsiteX1" fmla="*/ 42478 w 254863"/>
+                  <a:gd name="connsiteY1" fmla="*/ 0 h 1219200"/>
+                  <a:gd name="connsiteX2" fmla="*/ 212385 w 254863"/>
+                  <a:gd name="connsiteY2" fmla="*/ 0 h 1219200"/>
+                  <a:gd name="connsiteX3" fmla="*/ 254863 w 254863"/>
+                  <a:gd name="connsiteY3" fmla="*/ 42478 h 1219200"/>
+                  <a:gd name="connsiteX4" fmla="*/ 210413 w 254863"/>
+                  <a:gd name="connsiteY4" fmla="*/ 884622 h 1219200"/>
+                  <a:gd name="connsiteX5" fmla="*/ 212385 w 254863"/>
+                  <a:gd name="connsiteY5" fmla="*/ 1219200 h 1219200"/>
+                  <a:gd name="connsiteX6" fmla="*/ 42478 w 254863"/>
+                  <a:gd name="connsiteY6" fmla="*/ 1219200 h 1219200"/>
+                  <a:gd name="connsiteX7" fmla="*/ 38100 w 254863"/>
+                  <a:gd name="connsiteY7" fmla="*/ 1062422 h 1219200"/>
+                  <a:gd name="connsiteX8" fmla="*/ 0 w 254863"/>
+                  <a:gd name="connsiteY8" fmla="*/ 42478 h 1219200"/>
+                  <a:gd name="connsiteX0" fmla="*/ 0 w 254863"/>
+                  <a:gd name="connsiteY0" fmla="*/ 42478 h 1219200"/>
+                  <a:gd name="connsiteX1" fmla="*/ 42478 w 254863"/>
+                  <a:gd name="connsiteY1" fmla="*/ 0 h 1219200"/>
+                  <a:gd name="connsiteX2" fmla="*/ 212385 w 254863"/>
+                  <a:gd name="connsiteY2" fmla="*/ 0 h 1219200"/>
+                  <a:gd name="connsiteX3" fmla="*/ 254863 w 254863"/>
+                  <a:gd name="connsiteY3" fmla="*/ 42478 h 1219200"/>
+                  <a:gd name="connsiteX4" fmla="*/ 210413 w 254863"/>
+                  <a:gd name="connsiteY4" fmla="*/ 884622 h 1219200"/>
+                  <a:gd name="connsiteX5" fmla="*/ 212385 w 254863"/>
+                  <a:gd name="connsiteY5" fmla="*/ 1219200 h 1219200"/>
+                  <a:gd name="connsiteX6" fmla="*/ 42478 w 254863"/>
+                  <a:gd name="connsiteY6" fmla="*/ 1219200 h 1219200"/>
+                  <a:gd name="connsiteX7" fmla="*/ 69850 w 254863"/>
+                  <a:gd name="connsiteY7" fmla="*/ 859222 h 1219200"/>
+                  <a:gd name="connsiteX8" fmla="*/ 0 w 254863"/>
+                  <a:gd name="connsiteY8" fmla="*/ 42478 h 1219200"/>
+                  <a:gd name="connsiteX0" fmla="*/ 0 w 254863"/>
+                  <a:gd name="connsiteY0" fmla="*/ 42478 h 1225550"/>
+                  <a:gd name="connsiteX1" fmla="*/ 42478 w 254863"/>
+                  <a:gd name="connsiteY1" fmla="*/ 0 h 1225550"/>
+                  <a:gd name="connsiteX2" fmla="*/ 212385 w 254863"/>
+                  <a:gd name="connsiteY2" fmla="*/ 0 h 1225550"/>
+                  <a:gd name="connsiteX3" fmla="*/ 254863 w 254863"/>
+                  <a:gd name="connsiteY3" fmla="*/ 42478 h 1225550"/>
+                  <a:gd name="connsiteX4" fmla="*/ 210413 w 254863"/>
+                  <a:gd name="connsiteY4" fmla="*/ 884622 h 1225550"/>
+                  <a:gd name="connsiteX5" fmla="*/ 212385 w 254863"/>
+                  <a:gd name="connsiteY5" fmla="*/ 1219200 h 1225550"/>
+                  <a:gd name="connsiteX6" fmla="*/ 80578 w 254863"/>
+                  <a:gd name="connsiteY6" fmla="*/ 1225550 h 1225550"/>
+                  <a:gd name="connsiteX7" fmla="*/ 69850 w 254863"/>
+                  <a:gd name="connsiteY7" fmla="*/ 859222 h 1225550"/>
+                  <a:gd name="connsiteX8" fmla="*/ 0 w 254863"/>
+                  <a:gd name="connsiteY8" fmla="*/ 42478 h 1225550"/>
+                  <a:gd name="connsiteX0" fmla="*/ 0 w 254863"/>
+                  <a:gd name="connsiteY0" fmla="*/ 42478 h 1225550"/>
+                  <a:gd name="connsiteX1" fmla="*/ 42478 w 254863"/>
+                  <a:gd name="connsiteY1" fmla="*/ 0 h 1225550"/>
+                  <a:gd name="connsiteX2" fmla="*/ 212385 w 254863"/>
+                  <a:gd name="connsiteY2" fmla="*/ 0 h 1225550"/>
+                  <a:gd name="connsiteX3" fmla="*/ 254863 w 254863"/>
+                  <a:gd name="connsiteY3" fmla="*/ 42478 h 1225550"/>
+                  <a:gd name="connsiteX4" fmla="*/ 210413 w 254863"/>
+                  <a:gd name="connsiteY4" fmla="*/ 884622 h 1225550"/>
+                  <a:gd name="connsiteX5" fmla="*/ 180635 w 254863"/>
+                  <a:gd name="connsiteY5" fmla="*/ 1219200 h 1225550"/>
+                  <a:gd name="connsiteX6" fmla="*/ 80578 w 254863"/>
+                  <a:gd name="connsiteY6" fmla="*/ 1225550 h 1225550"/>
+                  <a:gd name="connsiteX7" fmla="*/ 69850 w 254863"/>
+                  <a:gd name="connsiteY7" fmla="*/ 859222 h 1225550"/>
+                  <a:gd name="connsiteX8" fmla="*/ 0 w 254863"/>
+                  <a:gd name="connsiteY8" fmla="*/ 42478 h 1225550"/>
+                </a:gdLst>
+                <a:ahLst/>
+                <a:cxnLst>
+                  <a:cxn ang="0">
+                    <a:pos x="connsiteX0" y="connsiteY0"/>
+                  </a:cxn>
+                  <a:cxn ang="0">
+                    <a:pos x="connsiteX1" y="connsiteY1"/>
+                  </a:cxn>
+                  <a:cxn ang="0">
+                    <a:pos x="connsiteX2" y="connsiteY2"/>
+                  </a:cxn>
+                  <a:cxn ang="0">
+                    <a:pos x="connsiteX3" y="connsiteY3"/>
+                  </a:cxn>
+                  <a:cxn ang="0">
+                    <a:pos x="connsiteX4" y="connsiteY4"/>
+                  </a:cxn>
+                  <a:cxn ang="0">
+                    <a:pos x="connsiteX5" y="connsiteY5"/>
+                  </a:cxn>
+                  <a:cxn ang="0">
+                    <a:pos x="connsiteX6" y="connsiteY6"/>
+                  </a:cxn>
+                  <a:cxn ang="0">
+                    <a:pos x="connsiteX7" y="connsiteY7"/>
+                  </a:cxn>
+                  <a:cxn ang="0">
+                    <a:pos x="connsiteX8" y="connsiteY8"/>
+                  </a:cxn>
+                </a:cxnLst>
+                <a:rect l="l" t="t" r="r" b="b"/>
+                <a:pathLst>
+                  <a:path w="254863" h="1225550">
+                    <a:moveTo>
+                      <a:pt x="0" y="42478"/>
+                    </a:moveTo>
+                    <a:cubicBezTo>
+                      <a:pt x="0" y="19018"/>
+                      <a:pt x="19018" y="0"/>
+                      <a:pt x="42478" y="0"/>
+                    </a:cubicBezTo>
+                    <a:lnTo>
+                      <a:pt x="212385" y="0"/>
+                    </a:lnTo>
+                    <a:cubicBezTo>
+                      <a:pt x="235845" y="0"/>
+                      <a:pt x="254863" y="19018"/>
+                      <a:pt x="254863" y="42478"/>
+                    </a:cubicBezTo>
+                    <a:cubicBezTo>
+                      <a:pt x="254863" y="420559"/>
+                      <a:pt x="210413" y="506541"/>
+                      <a:pt x="210413" y="884622"/>
+                    </a:cubicBezTo>
+                    <a:cubicBezTo>
+                      <a:pt x="210413" y="908082"/>
+                      <a:pt x="204095" y="1219200"/>
+                      <a:pt x="180635" y="1219200"/>
+                    </a:cubicBezTo>
+                    <a:lnTo>
+                      <a:pt x="80578" y="1225550"/>
+                    </a:lnTo>
+                    <a:cubicBezTo>
+                      <a:pt x="57118" y="1225550"/>
+                      <a:pt x="69850" y="882682"/>
+                      <a:pt x="69850" y="859222"/>
+                    </a:cubicBezTo>
+                    <a:lnTo>
+                      <a:pt x="0" y="42478"/>
+                    </a:lnTo>
+                    <a:close/>
+                  </a:path>
+                </a:pathLst>
+              </a:custGeom>
+            </p:spPr>
+            <p:style>
+              <a:lnRef idx="2">
+                <a:schemeClr val="accent1">
+                  <a:shade val="50000"/>
+                </a:schemeClr>
+              </a:lnRef>
+              <a:fillRef idx="1">
+                <a:schemeClr val="accent1"/>
+              </a:fillRef>
+              <a:effectRef idx="0">
+                <a:schemeClr val="accent1"/>
+              </a:effectRef>
+              <a:fontRef idx="minor">
+                <a:schemeClr val="lt1"/>
+              </a:fontRef>
+            </p:style>
+            <p:txBody>
+              <a:bodyPr rtlCol="0" anchor="ctr"/>
+              <a:lstStyle/>
+              <a:p>
+                <a:pPr algn="ctr"/>
+                <a:endParaRPr lang="en-US"/>
+              </a:p>
+            </p:txBody>
+          </p:sp>
+          <p:sp>
+            <p:nvSpPr>
+              <p:cNvPr id="19" name="Pie 5">
+                <a:extLst>
+                  <a:ext uri="{FF2B5EF4-FFF2-40B4-BE49-F238E27FC236}">
+                    <a16:creationId xmlns:a16="http://schemas.microsoft.com/office/drawing/2014/main" id="{6C3A01CE-E50F-4158-AD23-D50B6BCF0C31}"/>
+                  </a:ext>
+                </a:extLst>
+              </p:cNvPr>
+              <p:cNvSpPr/>
+              <p:nvPr/>
+            </p:nvSpPr>
+            <p:spPr>
+              <a:xfrm>
+                <a:off x="1970301" y="1465047"/>
+                <a:ext cx="609599" cy="631326"/>
+              </a:xfrm>
+              <a:custGeom>
+                <a:avLst/>
+                <a:gdLst>
+                  <a:gd name="connsiteX0" fmla="*/ 387 w 1219200"/>
+                  <a:gd name="connsiteY0" fmla="*/ 631326 h 1219200"/>
+                  <a:gd name="connsiteX1" fmla="*/ 170933 w 1219200"/>
+                  <a:gd name="connsiteY1" fmla="*/ 186299 h 1219200"/>
+                  <a:gd name="connsiteX2" fmla="*/ 609599 w 1219200"/>
+                  <a:gd name="connsiteY2" fmla="*/ 0 h 1219200"/>
+                  <a:gd name="connsiteX3" fmla="*/ 609600 w 1219200"/>
+                  <a:gd name="connsiteY3" fmla="*/ 609600 h 1219200"/>
+                  <a:gd name="connsiteX4" fmla="*/ 387 w 1219200"/>
+                  <a:gd name="connsiteY4" fmla="*/ 631326 h 1219200"/>
+                  <a:gd name="connsiteX0" fmla="*/ 387 w 609599"/>
+                  <a:gd name="connsiteY0" fmla="*/ 631326 h 631326"/>
+                  <a:gd name="connsiteX1" fmla="*/ 170933 w 609599"/>
+                  <a:gd name="connsiteY1" fmla="*/ 186299 h 631326"/>
+                  <a:gd name="connsiteX2" fmla="*/ 609599 w 609599"/>
+                  <a:gd name="connsiteY2" fmla="*/ 0 h 631326"/>
+                  <a:gd name="connsiteX3" fmla="*/ 508000 w 609599"/>
+                  <a:gd name="connsiteY3" fmla="*/ 533400 h 631326"/>
+                  <a:gd name="connsiteX4" fmla="*/ 387 w 609599"/>
+                  <a:gd name="connsiteY4" fmla="*/ 631326 h 631326"/>
+                </a:gdLst>
+                <a:ahLst/>
+                <a:cxnLst>
+                  <a:cxn ang="0">
+                    <a:pos x="connsiteX0" y="connsiteY0"/>
+                  </a:cxn>
+                  <a:cxn ang="0">
+                    <a:pos x="connsiteX1" y="connsiteY1"/>
+                  </a:cxn>
+                  <a:cxn ang="0">
+                    <a:pos x="connsiteX2" y="connsiteY2"/>
+                  </a:cxn>
+                  <a:cxn ang="0">
+                    <a:pos x="connsiteX3" y="connsiteY3"/>
+                  </a:cxn>
+                  <a:cxn ang="0">
+                    <a:pos x="connsiteX4" y="connsiteY4"/>
+                  </a:cxn>
+                </a:cxnLst>
+                <a:rect l="l" t="t" r="r" b="b"/>
+                <a:pathLst>
+                  <a:path w="609599" h="631326">
+                    <a:moveTo>
+                      <a:pt x="387" y="631326"/>
+                    </a:moveTo>
+                    <a:cubicBezTo>
+                      <a:pt x="-5509" y="465987"/>
+                      <a:pt x="56050" y="305352"/>
+                      <a:pt x="170933" y="186299"/>
+                    </a:cubicBezTo>
+                    <a:cubicBezTo>
+                      <a:pt x="285816" y="67246"/>
+                      <a:pt x="444155" y="0"/>
+                      <a:pt x="609599" y="0"/>
+                    </a:cubicBezTo>
+                    <a:cubicBezTo>
+                      <a:pt x="609599" y="203200"/>
+                      <a:pt x="508000" y="330200"/>
+                      <a:pt x="508000" y="533400"/>
+                    </a:cubicBezTo>
+                    <a:cubicBezTo>
+                      <a:pt x="304929" y="540642"/>
+                      <a:pt x="203458" y="624084"/>
+                      <a:pt x="387" y="631326"/>
+                    </a:cubicBezTo>
+                    <a:close/>
+                  </a:path>
+                </a:pathLst>
+              </a:custGeom>
+            </p:spPr>
+            <p:style>
+              <a:lnRef idx="2">
+                <a:schemeClr val="accent1">
+                  <a:shade val="50000"/>
+                </a:schemeClr>
+              </a:lnRef>
+              <a:fillRef idx="1">
+                <a:schemeClr val="accent1"/>
+              </a:fillRef>
+              <a:effectRef idx="0">
+                <a:schemeClr val="accent1"/>
+              </a:effectRef>
+              <a:fontRef idx="minor">
+                <a:schemeClr val="lt1"/>
+              </a:fontRef>
+            </p:style>
+            <p:txBody>
+              <a:bodyPr rtlCol="0" anchor="ctr"/>
+              <a:lstStyle/>
+              <a:p>
+                <a:pPr algn="ctr"/>
+                <a:endParaRPr lang="en-US">
+                  <a:solidFill>
+                    <a:schemeClr val="tx1"/>
+                  </a:solidFill>
+                </a:endParaRPr>
+              </a:p>
+            </p:txBody>
+          </p:sp>
+          <p:sp>
+            <p:nvSpPr>
+              <p:cNvPr id="21" name="Rounded Rectangle 4">
+                <a:extLst>
+                  <a:ext uri="{FF2B5EF4-FFF2-40B4-BE49-F238E27FC236}">
+                    <a16:creationId xmlns:a16="http://schemas.microsoft.com/office/drawing/2014/main" id="{F5287E91-19BE-468E-A9C9-41E81578FE9E}"/>
+                  </a:ext>
+                </a:extLst>
+              </p:cNvPr>
+              <p:cNvSpPr/>
+              <p:nvPr/>
+            </p:nvSpPr>
+            <p:spPr>
+              <a:xfrm>
+                <a:off x="2056171" y="1447800"/>
+                <a:ext cx="1573162" cy="2327562"/>
+              </a:xfrm>
+              <a:custGeom>
+                <a:avLst/>
+                <a:gdLst>
+                  <a:gd name="connsiteX0" fmla="*/ 0 w 1219200"/>
+                  <a:gd name="connsiteY0" fmla="*/ 203204 h 2286000"/>
+                  <a:gd name="connsiteX1" fmla="*/ 203204 w 1219200"/>
+                  <a:gd name="connsiteY1" fmla="*/ 0 h 2286000"/>
+                  <a:gd name="connsiteX2" fmla="*/ 1015996 w 1219200"/>
+                  <a:gd name="connsiteY2" fmla="*/ 0 h 2286000"/>
+                  <a:gd name="connsiteX3" fmla="*/ 1219200 w 1219200"/>
+                  <a:gd name="connsiteY3" fmla="*/ 203204 h 2286000"/>
+                  <a:gd name="connsiteX4" fmla="*/ 1219200 w 1219200"/>
+                  <a:gd name="connsiteY4" fmla="*/ 2082796 h 2286000"/>
+                  <a:gd name="connsiteX5" fmla="*/ 1015996 w 1219200"/>
+                  <a:gd name="connsiteY5" fmla="*/ 2286000 h 2286000"/>
+                  <a:gd name="connsiteX6" fmla="*/ 203204 w 1219200"/>
+                  <a:gd name="connsiteY6" fmla="*/ 2286000 h 2286000"/>
+                  <a:gd name="connsiteX7" fmla="*/ 0 w 1219200"/>
+                  <a:gd name="connsiteY7" fmla="*/ 2082796 h 2286000"/>
+                  <a:gd name="connsiteX8" fmla="*/ 0 w 1219200"/>
+                  <a:gd name="connsiteY8" fmla="*/ 203204 h 2286000"/>
+                  <a:gd name="connsiteX0" fmla="*/ 191729 w 1410929"/>
+                  <a:gd name="connsiteY0" fmla="*/ 203204 h 2308300"/>
+                  <a:gd name="connsiteX1" fmla="*/ 394933 w 1410929"/>
+                  <a:gd name="connsiteY1" fmla="*/ 0 h 2308300"/>
+                  <a:gd name="connsiteX2" fmla="*/ 1207725 w 1410929"/>
+                  <a:gd name="connsiteY2" fmla="*/ 0 h 2308300"/>
+                  <a:gd name="connsiteX3" fmla="*/ 1410929 w 1410929"/>
+                  <a:gd name="connsiteY3" fmla="*/ 203204 h 2308300"/>
+                  <a:gd name="connsiteX4" fmla="*/ 1410929 w 1410929"/>
+                  <a:gd name="connsiteY4" fmla="*/ 2082796 h 2308300"/>
+                  <a:gd name="connsiteX5" fmla="*/ 1207725 w 1410929"/>
+                  <a:gd name="connsiteY5" fmla="*/ 2286000 h 2308300"/>
+                  <a:gd name="connsiteX6" fmla="*/ 394933 w 1410929"/>
+                  <a:gd name="connsiteY6" fmla="*/ 2286000 h 2308300"/>
+                  <a:gd name="connsiteX7" fmla="*/ 0 w 1410929"/>
+                  <a:gd name="connsiteY7" fmla="*/ 2245028 h 2308300"/>
+                  <a:gd name="connsiteX8" fmla="*/ 191729 w 1410929"/>
+                  <a:gd name="connsiteY8" fmla="*/ 203204 h 2308300"/>
+                  <a:gd name="connsiteX0" fmla="*/ 191729 w 1573162"/>
+                  <a:gd name="connsiteY0" fmla="*/ 203204 h 2327562"/>
+                  <a:gd name="connsiteX1" fmla="*/ 394933 w 1573162"/>
+                  <a:gd name="connsiteY1" fmla="*/ 0 h 2327562"/>
+                  <a:gd name="connsiteX2" fmla="*/ 1207725 w 1573162"/>
+                  <a:gd name="connsiteY2" fmla="*/ 0 h 2327562"/>
+                  <a:gd name="connsiteX3" fmla="*/ 1410929 w 1573162"/>
+                  <a:gd name="connsiteY3" fmla="*/ 203204 h 2327562"/>
+                  <a:gd name="connsiteX4" fmla="*/ 1573162 w 1573162"/>
+                  <a:gd name="connsiteY4" fmla="*/ 2274525 h 2327562"/>
+                  <a:gd name="connsiteX5" fmla="*/ 1207725 w 1573162"/>
+                  <a:gd name="connsiteY5" fmla="*/ 2286000 h 2327562"/>
+                  <a:gd name="connsiteX6" fmla="*/ 394933 w 1573162"/>
+                  <a:gd name="connsiteY6" fmla="*/ 2286000 h 2327562"/>
+                  <a:gd name="connsiteX7" fmla="*/ 0 w 1573162"/>
+                  <a:gd name="connsiteY7" fmla="*/ 2245028 h 2327562"/>
+                  <a:gd name="connsiteX8" fmla="*/ 191729 w 1573162"/>
+                  <a:gd name="connsiteY8" fmla="*/ 203204 h 2327562"/>
+                  <a:gd name="connsiteX0" fmla="*/ 356829 w 1573162"/>
+                  <a:gd name="connsiteY0" fmla="*/ 279404 h 2327562"/>
+                  <a:gd name="connsiteX1" fmla="*/ 394933 w 1573162"/>
+                  <a:gd name="connsiteY1" fmla="*/ 0 h 2327562"/>
+                  <a:gd name="connsiteX2" fmla="*/ 1207725 w 1573162"/>
+                  <a:gd name="connsiteY2" fmla="*/ 0 h 2327562"/>
+                  <a:gd name="connsiteX3" fmla="*/ 1410929 w 1573162"/>
+                  <a:gd name="connsiteY3" fmla="*/ 203204 h 2327562"/>
+                  <a:gd name="connsiteX4" fmla="*/ 1573162 w 1573162"/>
+                  <a:gd name="connsiteY4" fmla="*/ 2274525 h 2327562"/>
+                  <a:gd name="connsiteX5" fmla="*/ 1207725 w 1573162"/>
+                  <a:gd name="connsiteY5" fmla="*/ 2286000 h 2327562"/>
+                  <a:gd name="connsiteX6" fmla="*/ 394933 w 1573162"/>
+                  <a:gd name="connsiteY6" fmla="*/ 2286000 h 2327562"/>
+                  <a:gd name="connsiteX7" fmla="*/ 0 w 1573162"/>
+                  <a:gd name="connsiteY7" fmla="*/ 2245028 h 2327562"/>
+                  <a:gd name="connsiteX8" fmla="*/ 356829 w 1573162"/>
+                  <a:gd name="connsiteY8" fmla="*/ 279404 h 2327562"/>
+                  <a:gd name="connsiteX0" fmla="*/ 356829 w 1573162"/>
+                  <a:gd name="connsiteY0" fmla="*/ 279404 h 2327562"/>
+                  <a:gd name="connsiteX1" fmla="*/ 394933 w 1573162"/>
+                  <a:gd name="connsiteY1" fmla="*/ 0 h 2327562"/>
+                  <a:gd name="connsiteX2" fmla="*/ 1207725 w 1573162"/>
+                  <a:gd name="connsiteY2" fmla="*/ 0 h 2327562"/>
+                  <a:gd name="connsiteX3" fmla="*/ 1233129 w 1573162"/>
+                  <a:gd name="connsiteY3" fmla="*/ 241304 h 2327562"/>
+                  <a:gd name="connsiteX4" fmla="*/ 1573162 w 1573162"/>
+                  <a:gd name="connsiteY4" fmla="*/ 2274525 h 2327562"/>
+                  <a:gd name="connsiteX5" fmla="*/ 1207725 w 1573162"/>
+                  <a:gd name="connsiteY5" fmla="*/ 2286000 h 2327562"/>
+                  <a:gd name="connsiteX6" fmla="*/ 394933 w 1573162"/>
+                  <a:gd name="connsiteY6" fmla="*/ 2286000 h 2327562"/>
+                  <a:gd name="connsiteX7" fmla="*/ 0 w 1573162"/>
+                  <a:gd name="connsiteY7" fmla="*/ 2245028 h 2327562"/>
+                  <a:gd name="connsiteX8" fmla="*/ 356829 w 1573162"/>
+                  <a:gd name="connsiteY8" fmla="*/ 279404 h 2327562"/>
+                </a:gdLst>
+                <a:ahLst/>
+                <a:cxnLst>
+                  <a:cxn ang="0">
+                    <a:pos x="connsiteX0" y="connsiteY0"/>
+                  </a:cxn>
+                  <a:cxn ang="0">
+                    <a:pos x="connsiteX1" y="connsiteY1"/>
+                  </a:cxn>
+                  <a:cxn ang="0">
+                    <a:pos x="connsiteX2" y="connsiteY2"/>
+                  </a:cxn>
+                  <a:cxn ang="0">
+                    <a:pos x="connsiteX3" y="connsiteY3"/>
+                  </a:cxn>
+                  <a:cxn ang="0">
+                    <a:pos x="connsiteX4" y="connsiteY4"/>
+                  </a:cxn>
+                  <a:cxn ang="0">
+                    <a:pos x="connsiteX5" y="connsiteY5"/>
+                  </a:cxn>
+                  <a:cxn ang="0">
+                    <a:pos x="connsiteX6" y="connsiteY6"/>
+                  </a:cxn>
+                  <a:cxn ang="0">
+                    <a:pos x="connsiteX7" y="connsiteY7"/>
+                  </a:cxn>
+                  <a:cxn ang="0">
+                    <a:pos x="connsiteX8" y="connsiteY8"/>
+                  </a:cxn>
+                </a:cxnLst>
+                <a:rect l="l" t="t" r="r" b="b"/>
+                <a:pathLst>
+                  <a:path w="1573162" h="2327562">
+                    <a:moveTo>
+                      <a:pt x="356829" y="279404"/>
+                    </a:moveTo>
+                    <a:cubicBezTo>
+                      <a:pt x="356829" y="167178"/>
+                      <a:pt x="282707" y="0"/>
+                      <a:pt x="394933" y="0"/>
+                    </a:cubicBezTo>
+                    <a:lnTo>
+                      <a:pt x="1207725" y="0"/>
+                    </a:lnTo>
+                    <a:cubicBezTo>
+                      <a:pt x="1319951" y="0"/>
+                      <a:pt x="1233129" y="129078"/>
+                      <a:pt x="1233129" y="241304"/>
+                    </a:cubicBezTo>
+                    <a:lnTo>
+                      <a:pt x="1573162" y="2274525"/>
+                    </a:lnTo>
+                    <a:cubicBezTo>
+                      <a:pt x="1573162" y="2386751"/>
+                      <a:pt x="1319951" y="2286000"/>
+                      <a:pt x="1207725" y="2286000"/>
+                    </a:cubicBezTo>
+                    <a:lnTo>
+                      <a:pt x="394933" y="2286000"/>
+                    </a:lnTo>
+                    <a:cubicBezTo>
+                      <a:pt x="282707" y="2286000"/>
+                      <a:pt x="0" y="2357254"/>
+                      <a:pt x="0" y="2245028"/>
+                    </a:cubicBezTo>
+                    <a:cubicBezTo>
+                      <a:pt x="0" y="1618497"/>
+                      <a:pt x="356829" y="905935"/>
+                      <a:pt x="356829" y="279404"/>
+                    </a:cubicBezTo>
+                    <a:close/>
+                  </a:path>
+                </a:pathLst>
+              </a:custGeom>
+            </p:spPr>
+            <p:style>
+              <a:lnRef idx="2">
+                <a:schemeClr val="accent1">
+                  <a:shade val="50000"/>
+                </a:schemeClr>
+              </a:lnRef>
+              <a:fillRef idx="1">
+                <a:schemeClr val="accent1"/>
+              </a:fillRef>
+              <a:effectRef idx="0">
+                <a:schemeClr val="accent1"/>
+              </a:effectRef>
+              <a:fontRef idx="minor">
+                <a:schemeClr val="lt1"/>
+              </a:fontRef>
+            </p:style>
+            <p:txBody>
+              <a:bodyPr rtlCol="0" anchor="ctr"/>
+              <a:lstStyle/>
+              <a:p>
+                <a:pPr algn="ctr"/>
+                <a:endParaRPr lang="en-US"/>
+              </a:p>
+            </p:txBody>
+          </p:sp>
+          <p:sp>
+            <p:nvSpPr>
+              <p:cNvPr id="22" name="Oval 21">
+                <a:extLst>
+                  <a:ext uri="{FF2B5EF4-FFF2-40B4-BE49-F238E27FC236}">
+                    <a16:creationId xmlns:a16="http://schemas.microsoft.com/office/drawing/2014/main" id="{1A96049E-C9FB-4D66-BB13-4900913F2D82}"/>
+                  </a:ext>
+                </a:extLst>
+              </p:cNvPr>
+              <p:cNvSpPr/>
+              <p:nvPr/>
+            </p:nvSpPr>
+            <p:spPr>
+              <a:xfrm>
+                <a:off x="2362200" y="609600"/>
+                <a:ext cx="990600" cy="990600"/>
+              </a:xfrm>
+              <a:prstGeom prst="ellipse">
+                <a:avLst/>
+              </a:prstGeom>
+            </p:spPr>
+            <p:style>
+              <a:lnRef idx="2">
+                <a:schemeClr val="accent1">
+                  <a:shade val="50000"/>
+                </a:schemeClr>
+              </a:lnRef>
+              <a:fillRef idx="1">
+                <a:schemeClr val="accent1"/>
+              </a:fillRef>
+              <a:effectRef idx="0">
+                <a:schemeClr val="accent1"/>
+              </a:effectRef>
+              <a:fontRef idx="minor">
+                <a:schemeClr val="lt1"/>
+              </a:fontRef>
+            </p:style>
+            <p:txBody>
+              <a:bodyPr rtlCol="0" anchor="ctr"/>
+              <a:lstStyle/>
+              <a:p>
+                <a:pPr algn="ctr"/>
+                <a:endParaRPr lang="en-US"/>
+              </a:p>
+            </p:txBody>
+          </p:sp>
+        </p:grpSp>
+      </p:grpSp>
     </p:spTree>
     <p:extLst>
       <p:ext uri="{BB962C8B-B14F-4D97-AF65-F5344CB8AC3E}">

</xml_diff>